<commit_message>
minor edits just syncing up
</commit_message>
<xml_diff>
--- a/07-scheduling-scans-reports.pptx
+++ b/07-scheduling-scans-reports.pptx
@@ -6,10 +6,10 @@
     <p:sldMasterId id="2147483847" r:id="rId6"/>
   </p:sldMasterIdLst>
   <p:notesMasterIdLst>
-    <p:notesMasterId r:id="rId32"/>
+    <p:notesMasterId r:id="rId33"/>
   </p:notesMasterIdLst>
   <p:handoutMasterIdLst>
-    <p:handoutMasterId r:id="rId33"/>
+    <p:handoutMasterId r:id="rId34"/>
   </p:handoutMasterIdLst>
   <p:sldIdLst>
     <p:sldId id="256" r:id="rId7"/>
@@ -35,8 +35,9 @@
     <p:sldId id="338" r:id="rId27"/>
     <p:sldId id="339" r:id="rId28"/>
     <p:sldId id="340" r:id="rId29"/>
-    <p:sldId id="276" r:id="rId30"/>
-    <p:sldId id="267" r:id="rId31"/>
+    <p:sldId id="341" r:id="rId30"/>
+    <p:sldId id="276" r:id="rId31"/>
+    <p:sldId id="267" r:id="rId32"/>
   </p:sldIdLst>
   <p:sldSz cx="16256000" cy="9144000"/>
   <p:notesSz cx="6858000" cy="9144000"/>
@@ -298,7 +299,7 @@
               <a:pPr>
                 <a:defRPr/>
               </a:pPr>
-              <a:t>2016-01-29</a:t>
+              <a:t>2016-02-03</a:t>
             </a:fld>
             <a:endParaRPr lang="en-US" dirty="0"/>
           </a:p>
@@ -481,7 +482,7 @@
               <a:pPr>
                 <a:defRPr/>
               </a:pPr>
-              <a:t>2016-01-29</a:t>
+              <a:t>2016-02-03</a:t>
             </a:fld>
             <a:endParaRPr lang="en-US" dirty="0"/>
           </a:p>
@@ -1060,18 +1061,6 @@
           <a:bodyPr/>
           <a:lstStyle/>
           <a:p>
-            <a:r>
-              <a:rPr lang="en-US" dirty="0" smtClean="0"/>
-              <a:t>TBD explain </a:t>
-            </a:r>
-            <a:r>
-              <a:rPr lang="en-US" dirty="0" err="1" smtClean="0"/>
-              <a:t>json</a:t>
-            </a:r>
-            <a:r>
-              <a:rPr lang="en-US" dirty="0" smtClean="0"/>
-              <a:t> exporting?</a:t>
-            </a:r>
             <a:endParaRPr lang="en-US" dirty="0"/>
           </a:p>
         </p:txBody>
@@ -1099,7 +1088,7 @@
               <a:pPr>
                 <a:defRPr/>
               </a:pPr>
-              <a:t>19</a:t>
+              <a:t>17</a:t>
             </a:fld>
             <a:endParaRPr lang="en-US" dirty="0"/>
           </a:p>
@@ -1152,7 +1141,7 @@
     </p:spTree>
     <p:extLst>
       <p:ext uri="{BB962C8B-B14F-4D97-AF65-F5344CB8AC3E}">
-        <p14:creationId xmlns:p14="http://schemas.microsoft.com/office/powerpoint/2010/main" val="950970001"/>
+        <p14:creationId xmlns:p14="http://schemas.microsoft.com/office/powerpoint/2010/main" val="156069988"/>
       </p:ext>
     </p:extLst>
   </p:cSld>
@@ -1208,6 +1197,152 @@
           <a:p>
             <a:r>
               <a:rPr lang="en-US" dirty="0" smtClean="0"/>
+              <a:t>TBD explain </a:t>
+            </a:r>
+            <a:r>
+              <a:rPr lang="en-US" dirty="0" err="1" smtClean="0"/>
+              <a:t>json</a:t>
+            </a:r>
+            <a:r>
+              <a:rPr lang="en-US" dirty="0" smtClean="0"/>
+              <a:t> exporting?</a:t>
+            </a:r>
+            <a:endParaRPr lang="en-US" dirty="0"/>
+          </a:p>
+        </p:txBody>
+      </p:sp>
+      <p:sp>
+        <p:nvSpPr>
+          <p:cNvPr id="4" name="Slide Number Placeholder 3"/>
+          <p:cNvSpPr>
+            <a:spLocks noGrp="1"/>
+          </p:cNvSpPr>
+          <p:nvPr>
+            <p:ph type="sldNum" sz="quarter" idx="10"/>
+          </p:nvPr>
+        </p:nvSpPr>
+        <p:spPr/>
+        <p:txBody>
+          <a:bodyPr/>
+          <a:lstStyle/>
+          <a:p>
+            <a:pPr>
+              <a:defRPr/>
+            </a:pPr>
+            <a:fld id="{DC3734AA-3150-D947-AC52-2F5DF48BFCD5}" type="slidenum">
+              <a:rPr lang="en-US" smtClean="0"/>
+              <a:pPr>
+                <a:defRPr/>
+              </a:pPr>
+              <a:t>19</a:t>
+            </a:fld>
+            <a:endParaRPr lang="en-US" dirty="0"/>
+          </a:p>
+        </p:txBody>
+      </p:sp>
+      <p:sp>
+        <p:nvSpPr>
+          <p:cNvPr id="5" name="Header Placeholder 4"/>
+          <p:cNvSpPr>
+            <a:spLocks noGrp="1"/>
+          </p:cNvSpPr>
+          <p:nvPr>
+            <p:ph type="hdr" sz="quarter" idx="11"/>
+          </p:nvPr>
+        </p:nvSpPr>
+        <p:spPr/>
+        <p:txBody>
+          <a:bodyPr/>
+          <a:lstStyle/>
+          <a:p>
+            <a:pPr>
+              <a:defRPr/>
+            </a:pPr>
+            <a:endParaRPr lang="en-US"/>
+          </a:p>
+        </p:txBody>
+      </p:sp>
+      <p:sp>
+        <p:nvSpPr>
+          <p:cNvPr id="6" name="Footer Placeholder 5"/>
+          <p:cNvSpPr>
+            <a:spLocks noGrp="1"/>
+          </p:cNvSpPr>
+          <p:nvPr>
+            <p:ph type="ftr" sz="quarter" idx="12"/>
+          </p:nvPr>
+        </p:nvSpPr>
+        <p:spPr/>
+        <p:txBody>
+          <a:bodyPr/>
+          <a:lstStyle/>
+          <a:p>
+            <a:pPr>
+              <a:defRPr/>
+            </a:pPr>
+            <a:endParaRPr lang="en-US"/>
+          </a:p>
+        </p:txBody>
+      </p:sp>
+    </p:spTree>
+    <p:extLst>
+      <p:ext uri="{BB962C8B-B14F-4D97-AF65-F5344CB8AC3E}">
+        <p14:creationId xmlns:p14="http://schemas.microsoft.com/office/powerpoint/2010/main" val="950970001"/>
+      </p:ext>
+    </p:extLst>
+  </p:cSld>
+  <p:clrMapOvr>
+    <a:masterClrMapping/>
+  </p:clrMapOvr>
+</p:notes>
+</file>
+
+<file path=ppt/notesSlides/notesSlide12.xml><?xml version="1.0" encoding="utf-8"?>
+<p:notes xmlns:a="http://schemas.openxmlformats.org/drawingml/2006/main" xmlns:r="http://schemas.openxmlformats.org/officeDocument/2006/relationships" xmlns:p="http://schemas.openxmlformats.org/presentationml/2006/main">
+  <p:cSld>
+    <p:spTree>
+      <p:nvGrpSpPr>
+        <p:cNvPr id="1" name=""/>
+        <p:cNvGrpSpPr/>
+        <p:nvPr/>
+      </p:nvGrpSpPr>
+      <p:grpSpPr>
+        <a:xfrm>
+          <a:off x="0" y="0"/>
+          <a:ext cx="0" cy="0"/>
+          <a:chOff x="0" y="0"/>
+          <a:chExt cx="0" cy="0"/>
+        </a:xfrm>
+      </p:grpSpPr>
+      <p:sp>
+        <p:nvSpPr>
+          <p:cNvPr id="2" name="Slide Image Placeholder 1"/>
+          <p:cNvSpPr>
+            <a:spLocks noGrp="1" noRot="1" noChangeAspect="1"/>
+          </p:cNvSpPr>
+          <p:nvPr>
+            <p:ph type="sldImg"/>
+          </p:nvPr>
+        </p:nvSpPr>
+        <p:spPr/>
+      </p:sp>
+      <p:sp>
+        <p:nvSpPr>
+          <p:cNvPr id="3" name="Notes Placeholder 2"/>
+          <p:cNvSpPr>
+            <a:spLocks noGrp="1"/>
+          </p:cNvSpPr>
+          <p:nvPr>
+            <p:ph type="body" idx="1"/>
+          </p:nvPr>
+        </p:nvSpPr>
+        <p:spPr/>
+        <p:txBody>
+          <a:bodyPr/>
+          <a:lstStyle/>
+          <a:p>
+            <a:r>
+              <a:rPr lang="en-US" dirty="0" smtClean="0"/>
               <a:t>Instructor Note: This section is more of a placeholder for exporting Compliance reports after the email and Excel</a:t>
             </a:r>
             <a:r>
@@ -1304,7 +1439,7 @@
 </p:notes>
 </file>
 
-<file path=ppt/notesSlides/notesSlide12.xml><?xml version="1.0" encoding="utf-8"?>
+<file path=ppt/notesSlides/notesSlide13.xml><?xml version="1.0" encoding="utf-8"?>
 <p:notes xmlns:a="http://schemas.openxmlformats.org/drawingml/2006/main" xmlns:r="http://schemas.openxmlformats.org/officeDocument/2006/relationships" xmlns:p="http://schemas.openxmlformats.org/presentationml/2006/main">
   <p:cSld>
     <p:spTree>
@@ -1849,8 +1984,12 @@
           <a:lstStyle/>
           <a:p>
             <a:r>
-              <a:rPr lang="en-US" dirty="0" smtClean="0"/>
-              <a:t>TBD Delete button after click.</a:t>
+              <a:rPr lang="en-US" dirty="0" err="1" smtClean="0"/>
+              <a:t>tbd</a:t>
+            </a:r>
+            <a:r>
+              <a:rPr lang="en-US" dirty="0" smtClean="0"/>
+              <a:t>-update screen with name defined.</a:t>
             </a:r>
             <a:endParaRPr lang="en-US" dirty="0"/>
           </a:p>
@@ -1879,7 +2018,7 @@
               <a:pPr>
                 <a:defRPr/>
               </a:pPr>
-              <a:t>10</a:t>
+              <a:t>9</a:t>
             </a:fld>
             <a:endParaRPr lang="en-US" dirty="0"/>
           </a:p>
@@ -1932,7 +2071,7 @@
     </p:spTree>
     <p:extLst>
       <p:ext uri="{BB962C8B-B14F-4D97-AF65-F5344CB8AC3E}">
-        <p14:creationId xmlns:p14="http://schemas.microsoft.com/office/powerpoint/2010/main" val="3077080090"/>
+        <p14:creationId xmlns:p14="http://schemas.microsoft.com/office/powerpoint/2010/main" val="203755913"/>
       </p:ext>
     </p:extLst>
   </p:cSld>
@@ -1988,7 +2127,7 @@
           <a:p>
             <a:r>
               <a:rPr lang="en-US" dirty="0" smtClean="0"/>
-              <a:t>It may take a minute or two after the scan is run for the report to display.</a:t>
+              <a:t>TBD Delete button after click.</a:t>
             </a:r>
             <a:endParaRPr lang="en-US" dirty="0"/>
           </a:p>
@@ -2017,7 +2156,7 @@
               <a:pPr>
                 <a:defRPr/>
               </a:pPr>
-              <a:t>11</a:t>
+              <a:t>10</a:t>
             </a:fld>
             <a:endParaRPr lang="en-US" dirty="0"/>
           </a:p>
@@ -2070,7 +2209,7 @@
     </p:spTree>
     <p:extLst>
       <p:ext uri="{BB962C8B-B14F-4D97-AF65-F5344CB8AC3E}">
-        <p14:creationId xmlns:p14="http://schemas.microsoft.com/office/powerpoint/2010/main" val="2974555743"/>
+        <p14:creationId xmlns:p14="http://schemas.microsoft.com/office/powerpoint/2010/main" val="3077080090"/>
       </p:ext>
     </p:extLst>
   </p:cSld>
@@ -2124,6 +2263,10 @@
           <a:bodyPr/>
           <a:lstStyle/>
           <a:p>
+            <a:r>
+              <a:rPr lang="en-US" dirty="0" smtClean="0"/>
+              <a:t>It may take a minute or two after the scan is run for the report to display.</a:t>
+            </a:r>
             <a:endParaRPr lang="en-US" dirty="0"/>
           </a:p>
         </p:txBody>
@@ -2151,7 +2294,7 @@
               <a:pPr>
                 <a:defRPr/>
               </a:pPr>
-              <a:t>14</a:t>
+              <a:t>11</a:t>
             </a:fld>
             <a:endParaRPr lang="en-US" dirty="0"/>
           </a:p>
@@ -2204,7 +2347,7 @@
     </p:spTree>
     <p:extLst>
       <p:ext uri="{BB962C8B-B14F-4D97-AF65-F5344CB8AC3E}">
-        <p14:creationId xmlns:p14="http://schemas.microsoft.com/office/powerpoint/2010/main" val="1630792651"/>
+        <p14:creationId xmlns:p14="http://schemas.microsoft.com/office/powerpoint/2010/main" val="2974555743"/>
       </p:ext>
     </p:extLst>
   </p:cSld>
@@ -2258,89 +2401,6 @@
           <a:bodyPr/>
           <a:lstStyle/>
           <a:p>
-            <a:pPr marL="0" marR="0" indent="0" algn="l" defTabSz="1217613" rtl="0" eaLnBrk="1" fontAlgn="base" latinLnBrk="0" hangingPunct="1">
-              <a:lnSpc>
-                <a:spcPct val="90000"/>
-              </a:lnSpc>
-              <a:spcBef>
-                <a:spcPct val="30000"/>
-              </a:spcBef>
-              <a:spcAft>
-                <a:spcPts val="450"/>
-              </a:spcAft>
-              <a:buClrTx/>
-              <a:buSzTx/>
-              <a:buFontTx/>
-              <a:buNone/>
-              <a:tabLst/>
-              <a:defRPr/>
-            </a:pPr>
-            <a:r>
-              <a:rPr lang="en-US" dirty="0" smtClean="0"/>
-              <a:t>Instructor Note: As this slide indicates, tailing the log files is not required but can be of interest to some users. In one scenario where it came in handy, a browser session to the Compliance Server</a:t>
-            </a:r>
-            <a:r>
-              <a:rPr lang="en-US" baseline="0" dirty="0" smtClean="0"/>
-              <a:t> got stale and would not schedule a scan. After tailing the log files and realizing the scan was not even being scheduled, the user refreshed the </a:t>
-            </a:r>
-            <a:r>
-              <a:rPr lang="en-US" dirty="0" smtClean="0"/>
-              <a:t>Compliance Server web UI</a:t>
-            </a:r>
-            <a:r>
-              <a:rPr lang="en-US" baseline="0" dirty="0" smtClean="0"/>
-              <a:t>, logged in again, and the scan would properly schedule and run.</a:t>
-            </a:r>
-          </a:p>
-          <a:p>
-            <a:pPr marL="0" marR="0" indent="0" algn="l" defTabSz="1217613" rtl="0" eaLnBrk="1" fontAlgn="base" latinLnBrk="0" hangingPunct="1">
-              <a:lnSpc>
-                <a:spcPct val="90000"/>
-              </a:lnSpc>
-              <a:spcBef>
-                <a:spcPct val="30000"/>
-              </a:spcBef>
-              <a:spcAft>
-                <a:spcPts val="450"/>
-              </a:spcAft>
-              <a:buClrTx/>
-              <a:buSzTx/>
-              <a:buFontTx/>
-              <a:buNone/>
-              <a:tabLst/>
-              <a:defRPr/>
-            </a:pPr>
-            <a:endParaRPr lang="en-US" baseline="0" dirty="0" smtClean="0"/>
-          </a:p>
-          <a:p>
-            <a:pPr marL="0" marR="0" indent="0" algn="l" defTabSz="1217613" rtl="0" eaLnBrk="1" fontAlgn="base" latinLnBrk="0" hangingPunct="1">
-              <a:lnSpc>
-                <a:spcPct val="90000"/>
-              </a:lnSpc>
-              <a:spcBef>
-                <a:spcPct val="30000"/>
-              </a:spcBef>
-              <a:spcAft>
-                <a:spcPts val="450"/>
-              </a:spcAft>
-              <a:buClrTx/>
-              <a:buSzTx/>
-              <a:buFontTx/>
-              <a:buNone/>
-              <a:tabLst/>
-              <a:defRPr/>
-            </a:pPr>
-            <a:r>
-              <a:rPr lang="en-US" dirty="0" smtClean="0"/>
-              <a:t>Instructor Note: If you find yourself ahead of schedule, you can spend some</a:t>
-            </a:r>
-            <a:r>
-              <a:rPr lang="en-US" baseline="0" dirty="0" smtClean="0"/>
-              <a:t> time demonstration the output of this log file as you perform a number of procedures via the Web UI.</a:t>
-            </a:r>
-            <a:endParaRPr lang="en-US" dirty="0" smtClean="0"/>
-          </a:p>
-          <a:p>
             <a:endParaRPr lang="en-US" dirty="0"/>
           </a:p>
         </p:txBody>
@@ -2368,7 +2428,7 @@
               <a:pPr>
                 <a:defRPr/>
               </a:pPr>
-              <a:t>15</a:t>
+              <a:t>14</a:t>
             </a:fld>
             <a:endParaRPr lang="en-US" dirty="0"/>
           </a:p>
@@ -2421,7 +2481,7 @@
     </p:spTree>
     <p:extLst>
       <p:ext uri="{BB962C8B-B14F-4D97-AF65-F5344CB8AC3E}">
-        <p14:creationId xmlns:p14="http://schemas.microsoft.com/office/powerpoint/2010/main" val="2421445266"/>
+        <p14:creationId xmlns:p14="http://schemas.microsoft.com/office/powerpoint/2010/main" val="1630792651"/>
       </p:ext>
     </p:extLst>
   </p:cSld>
@@ -2475,19 +2535,6 @@
           <a:bodyPr/>
           <a:lstStyle/>
           <a:p>
-            <a:r>
-              <a:rPr lang="en-US" dirty="0" smtClean="0"/>
-              <a:t>The image on the left shows the user setting the next scheduled scan for 1:45 P.M.</a:t>
-            </a:r>
-            <a:r>
-              <a:rPr lang="en-US" baseline="0" dirty="0" smtClean="0"/>
-              <a:t> local browser time.</a:t>
-            </a:r>
-          </a:p>
-          <a:p>
-            <a:endParaRPr lang="en-US" baseline="0" dirty="0" smtClean="0"/>
-          </a:p>
-          <a:p>
             <a:pPr marL="0" marR="0" indent="0" algn="l" defTabSz="1217613" rtl="0" eaLnBrk="1" fontAlgn="base" latinLnBrk="0" hangingPunct="1">
               <a:lnSpc>
                 <a:spcPct val="90000"/>
@@ -2506,41 +2553,72 @@
               <a:defRPr/>
             </a:pPr>
             <a:r>
+              <a:rPr lang="en-US" dirty="0" smtClean="0"/>
+              <a:t>Instructor Note: As this slide indicates, tailing the log files is not required but can be of interest to some users. In one scenario where it came in handy, a browser session to the Compliance Server</a:t>
+            </a:r>
+            <a:r>
               <a:rPr lang="en-US" baseline="0" dirty="0" smtClean="0"/>
-              <a:t>The image on the right shows the output of `</a:t>
-            </a:r>
-            <a:r>
-              <a:rPr lang="en-US" dirty="0" smtClean="0"/>
-              <a:t>sudo tail -f /var/log/chef-compliance/core/current`</a:t>
-            </a:r>
-            <a:r>
-              <a:rPr lang="en-US" baseline="0" dirty="0"/>
-              <a:t> </a:t>
+              <a:t> got stale and would not schedule a scan. After tailing the log files and realizing the scan was not even being scheduled, the user refreshed the </a:t>
+            </a:r>
+            <a:r>
+              <a:rPr lang="en-US" dirty="0" smtClean="0"/>
+              <a:t>Compliance Server web UI</a:t>
             </a:r>
             <a:r>
               <a:rPr lang="en-US" baseline="0" dirty="0" smtClean="0"/>
-              <a:t>taken at the very same time that the scan was scheduled. Notice the log file timestamps are in UTC and the next schedule scan is set for </a:t>
-            </a:r>
-            <a:br>
+              <a:t>, logged in again, and the scan would properly schedule and run.</a:t>
+            </a:r>
+          </a:p>
+          <a:p>
+            <a:pPr marL="0" marR="0" indent="0" algn="l" defTabSz="1217613" rtl="0" eaLnBrk="1" fontAlgn="base" latinLnBrk="0" hangingPunct="1">
+              <a:lnSpc>
+                <a:spcPct val="90000"/>
+              </a:lnSpc>
+              <a:spcBef>
+                <a:spcPct val="30000"/>
+              </a:spcBef>
+              <a:spcAft>
+                <a:spcPts val="450"/>
+              </a:spcAft>
+              <a:buClrTx/>
+              <a:buSzTx/>
+              <a:buFontTx/>
+              <a:buNone/>
+              <a:tabLst/>
+              <a:defRPr/>
+            </a:pPr>
+            <a:endParaRPr lang="en-US" baseline="0" dirty="0" smtClean="0"/>
+          </a:p>
+          <a:p>
+            <a:pPr marL="0" marR="0" indent="0" algn="l" defTabSz="1217613" rtl="0" eaLnBrk="1" fontAlgn="base" latinLnBrk="0" hangingPunct="1">
+              <a:lnSpc>
+                <a:spcPct val="90000"/>
+              </a:lnSpc>
+              <a:spcBef>
+                <a:spcPct val="30000"/>
+              </a:spcBef>
+              <a:spcAft>
+                <a:spcPts val="450"/>
+              </a:spcAft>
+              <a:buClrTx/>
+              <a:buSzTx/>
+              <a:buFontTx/>
+              <a:buNone/>
+              <a:tabLst/>
+              <a:defRPr/>
+            </a:pPr>
+            <a:r>
+              <a:rPr lang="en-US" dirty="0" smtClean="0"/>
+              <a:t>Instructor Note: If you find yourself ahead of schedule, you can spend some</a:t>
+            </a:r>
+            <a:r>
               <a:rPr lang="en-US" baseline="0" dirty="0" smtClean="0"/>
-            </a:br>
-            <a:r>
-              <a:rPr lang="en-US" baseline="0" dirty="0" smtClean="0"/>
-              <a:t>UTC: </a:t>
-            </a:r>
-            <a:r>
-              <a:rPr lang="en-US" sz="1200" b="1" dirty="0" smtClean="0"/>
-              <a:t>2016-01-12 21:45:00 </a:t>
-            </a:r>
-            <a:r>
-              <a:rPr lang="en-US" sz="1200" dirty="0" smtClean="0"/>
-              <a:t>+0000 UTC instead</a:t>
-            </a:r>
-            <a:r>
-              <a:rPr lang="en-US" sz="1200" baseline="0" dirty="0" smtClean="0"/>
-              <a:t> of the local browser time.</a:t>
+              <a:t> time demonstration the output of this log file as you perform a number of procedures via the Web UI.</a:t>
             </a:r>
             <a:endParaRPr lang="en-US" dirty="0" smtClean="0"/>
+          </a:p>
+          <a:p>
+            <a:endParaRPr lang="en-US" dirty="0"/>
           </a:p>
         </p:txBody>
       </p:sp>
@@ -2567,7 +2645,7 @@
               <a:pPr>
                 <a:defRPr/>
               </a:pPr>
-              <a:t>16</a:t>
+              <a:t>15</a:t>
             </a:fld>
             <a:endParaRPr lang="en-US" dirty="0"/>
           </a:p>
@@ -2620,7 +2698,7 @@
     </p:spTree>
     <p:extLst>
       <p:ext uri="{BB962C8B-B14F-4D97-AF65-F5344CB8AC3E}">
-        <p14:creationId xmlns:p14="http://schemas.microsoft.com/office/powerpoint/2010/main" val="1606503175"/>
+        <p14:creationId xmlns:p14="http://schemas.microsoft.com/office/powerpoint/2010/main" val="2421445266"/>
       </p:ext>
     </p:extLst>
   </p:cSld>
@@ -2674,7 +2752,72 @@
           <a:bodyPr/>
           <a:lstStyle/>
           <a:p>
-            <a:endParaRPr lang="en-US" dirty="0"/>
+            <a:r>
+              <a:rPr lang="en-US" dirty="0" smtClean="0"/>
+              <a:t>The image on the left shows the user setting the next scheduled scan for 1:45 P.M.</a:t>
+            </a:r>
+            <a:r>
+              <a:rPr lang="en-US" baseline="0" dirty="0" smtClean="0"/>
+              <a:t> local browser time.</a:t>
+            </a:r>
+          </a:p>
+          <a:p>
+            <a:endParaRPr lang="en-US" baseline="0" dirty="0" smtClean="0"/>
+          </a:p>
+          <a:p>
+            <a:pPr marL="0" marR="0" indent="0" algn="l" defTabSz="1217613" rtl="0" eaLnBrk="1" fontAlgn="base" latinLnBrk="0" hangingPunct="1">
+              <a:lnSpc>
+                <a:spcPct val="90000"/>
+              </a:lnSpc>
+              <a:spcBef>
+                <a:spcPct val="30000"/>
+              </a:spcBef>
+              <a:spcAft>
+                <a:spcPts val="450"/>
+              </a:spcAft>
+              <a:buClrTx/>
+              <a:buSzTx/>
+              <a:buFontTx/>
+              <a:buNone/>
+              <a:tabLst/>
+              <a:defRPr/>
+            </a:pPr>
+            <a:r>
+              <a:rPr lang="en-US" baseline="0" dirty="0" smtClean="0"/>
+              <a:t>The image on the right shows the output of `</a:t>
+            </a:r>
+            <a:r>
+              <a:rPr lang="en-US" dirty="0" smtClean="0"/>
+              <a:t>sudo tail -f /var/log/chef-compliance/core/current`</a:t>
+            </a:r>
+            <a:r>
+              <a:rPr lang="en-US" baseline="0" dirty="0"/>
+              <a:t> </a:t>
+            </a:r>
+            <a:r>
+              <a:rPr lang="en-US" baseline="0" dirty="0" smtClean="0"/>
+              <a:t>taken at the very same time that the scan was scheduled. Notice the log file timestamps are in UTC and the next schedule scan is set for </a:t>
+            </a:r>
+            <a:br>
+              <a:rPr lang="en-US" baseline="0" dirty="0" smtClean="0"/>
+            </a:br>
+            <a:r>
+              <a:rPr lang="en-US" baseline="0" dirty="0" smtClean="0"/>
+              <a:t>UTC: </a:t>
+            </a:r>
+            <a:r>
+              <a:rPr lang="en-US" sz="1200" b="1" dirty="0" smtClean="0"/>
+              <a:t>2016-01-12 21:45:00 </a:t>
+            </a:r>
+            <a:r>
+              <a:rPr lang="en-US" sz="1200" dirty="0" smtClean="0"/>
+              <a:t>+0000 UTC instead</a:t>
+            </a:r>
+            <a:r>
+              <a:rPr lang="en-US" sz="1200" baseline="0" dirty="0" smtClean="0"/>
+              <a:t> of the local browser time.</a:t>
+            </a:r>
+            <a:endParaRPr lang="en-US" dirty="0" smtClean="0"/>
           </a:p>
         </p:txBody>
       </p:sp>
@@ -2701,7 +2844,7 @@
               <a:pPr>
                 <a:defRPr/>
               </a:pPr>
-              <a:t>17</a:t>
+              <a:t>16</a:t>
             </a:fld>
             <a:endParaRPr lang="en-US" dirty="0"/>
           </a:p>
@@ -2754,7 +2897,7 @@
     </p:spTree>
     <p:extLst>
       <p:ext uri="{BB962C8B-B14F-4D97-AF65-F5344CB8AC3E}">
-        <p14:creationId xmlns:p14="http://schemas.microsoft.com/office/powerpoint/2010/main" val="156069988"/>
+        <p14:creationId xmlns:p14="http://schemas.microsoft.com/office/powerpoint/2010/main" val="1606503175"/>
       </p:ext>
     </p:extLst>
   </p:cSld>
@@ -9608,7 +9751,7 @@
                 <a:ea typeface="+mn-ea"/>
                 <a:cs typeface="+mn-cs"/>
               </a:rPr>
-              <a:t>6-</a:t>
+              <a:t>7-</a:t>
             </a:r>
             <a:fld id="{F0B79B2F-E1DD-4D43-95B3-EA08C411D807}" type="slidenum">
               <a:rPr lang="en-US" smtClean="0">
@@ -10367,7 +10510,7 @@
                 <a:ea typeface="+mn-ea"/>
                 <a:cs typeface="+mn-cs"/>
               </a:rPr>
-              <a:t>6-</a:t>
+              <a:t>7-</a:t>
             </a:r>
             <a:fld id="{F0B79B2F-E1DD-4D43-95B3-EA08C411D807}" type="slidenum">
               <a:rPr lang="en-US" smtClean="0">
@@ -11157,6 +11300,13 @@
   <p:transition spd="med">
     <p:fade/>
   </p:transition>
+  <p:timing>
+    <p:tnLst>
+      <p:par>
+        <p:cTn id="1" dur="indefinite" restart="never" nodeType="tmRoot"/>
+      </p:par>
+    </p:tnLst>
+  </p:timing>
 </p:sld>
 </file>
 
@@ -11272,6 +11422,13 @@
   <p:transition spd="med">
     <p:fade/>
   </p:transition>
+  <p:timing>
+    <p:tnLst>
+      <p:par>
+        <p:cTn id="1" dur="indefinite" restart="never" nodeType="tmRoot"/>
+      </p:par>
+    </p:tnLst>
+  </p:timing>
 </p:sld>
 </file>
 
@@ -11387,6 +11544,13 @@
   <p:transition spd="med">
     <p:fade/>
   </p:transition>
+  <p:timing>
+    <p:tnLst>
+      <p:par>
+        <p:cTn id="1" dur="indefinite" restart="never" nodeType="tmRoot"/>
+      </p:par>
+    </p:tnLst>
+  </p:timing>
 </p:sld>
 </file>
 
@@ -11540,6 +11704,13 @@
   <p:transition spd="med">
     <p:fade/>
   </p:transition>
+  <p:timing>
+    <p:tnLst>
+      <p:par>
+        <p:cTn id="1" dur="indefinite" restart="never" nodeType="tmRoot"/>
+      </p:par>
+    </p:tnLst>
+  </p:timing>
 </p:sld>
 </file>
 
@@ -11707,6 +11878,13 @@
   <p:transition spd="med">
     <p:fade/>
   </p:transition>
+  <p:timing>
+    <p:tnLst>
+      <p:par>
+        <p:cTn id="1" dur="indefinite" restart="never" nodeType="tmRoot"/>
+      </p:par>
+    </p:tnLst>
+  </p:timing>
 </p:sld>
 </file>
 
@@ -11842,6 +12020,13 @@
   <p:transition spd="med">
     <p:fade/>
   </p:transition>
+  <p:timing>
+    <p:tnLst>
+      <p:par>
+        <p:cTn id="1" dur="indefinite" restart="never" nodeType="tmRoot"/>
+      </p:par>
+    </p:tnLst>
+  </p:timing>
 </p:sld>
 </file>
 
@@ -13165,10 +13350,115 @@
   <p:transition spd="med">
     <p:fade/>
   </p:transition>
+  <p:timing>
+    <p:tnLst>
+      <p:par>
+        <p:cTn id="1" dur="indefinite" restart="never" nodeType="tmRoot"/>
+      </p:par>
+    </p:tnLst>
+  </p:timing>
 </p:sld>
 </file>
 
 <file path=ppt/slides/slide24.xml><?xml version="1.0" encoding="utf-8"?>
+<p:sld xmlns:a="http://schemas.openxmlformats.org/drawingml/2006/main" xmlns:r="http://schemas.openxmlformats.org/officeDocument/2006/relationships" xmlns:p="http://schemas.openxmlformats.org/presentationml/2006/main">
+  <p:cSld>
+    <p:spTree>
+      <p:nvGrpSpPr>
+        <p:cNvPr id="1" name=""/>
+        <p:cNvGrpSpPr/>
+        <p:nvPr/>
+      </p:nvGrpSpPr>
+      <p:grpSpPr>
+        <a:xfrm>
+          <a:off x="0" y="0"/>
+          <a:ext cx="0" cy="0"/>
+          <a:chOff x="0" y="0"/>
+          <a:chExt cx="0" cy="0"/>
+        </a:xfrm>
+      </p:grpSpPr>
+      <p:sp>
+        <p:nvSpPr>
+          <p:cNvPr id="2" name="Title 1"/>
+          <p:cNvSpPr>
+            <a:spLocks noGrp="1"/>
+          </p:cNvSpPr>
+          <p:nvPr>
+            <p:ph type="title"/>
+          </p:nvPr>
+        </p:nvSpPr>
+        <p:spPr>
+          <a:xfrm>
+            <a:off x="590405" y="371708"/>
+            <a:ext cx="14935200" cy="828675"/>
+          </a:xfrm>
+        </p:spPr>
+        <p:txBody>
+          <a:bodyPr/>
+          <a:lstStyle/>
+          <a:p>
+            <a:r>
+              <a:rPr lang="en-US" dirty="0" smtClean="0"/>
+              <a:t>GE: Exporting Reports</a:t>
+            </a:r>
+            <a:endParaRPr lang="en-US" dirty="0"/>
+          </a:p>
+        </p:txBody>
+      </p:sp>
+      <p:sp>
+        <p:nvSpPr>
+          <p:cNvPr id="3" name="Text Placeholder 2"/>
+          <p:cNvSpPr>
+            <a:spLocks noGrp="1"/>
+          </p:cNvSpPr>
+          <p:nvPr>
+            <p:ph type="body" sz="quarter" idx="12"/>
+          </p:nvPr>
+        </p:nvSpPr>
+        <p:spPr>
+          <a:xfrm>
+            <a:off x="590405" y="1856198"/>
+            <a:ext cx="5035144" cy="5345953"/>
+          </a:xfrm>
+        </p:spPr>
+        <p:txBody>
+          <a:bodyPr/>
+          <a:lstStyle/>
+          <a:p>
+            <a:r>
+              <a:rPr lang="en-US" dirty="0" smtClean="0"/>
+              <a:t>TBD Add export API info</a:t>
+            </a:r>
+          </a:p>
+          <a:p>
+            <a:endParaRPr lang="en-US" dirty="0"/>
+          </a:p>
+        </p:txBody>
+      </p:sp>
+    </p:spTree>
+    <p:extLst>
+      <p:ext uri="{BB962C8B-B14F-4D97-AF65-F5344CB8AC3E}">
+        <p14:creationId xmlns:p14="http://schemas.microsoft.com/office/powerpoint/2010/main" val="1901656965"/>
+      </p:ext>
+    </p:extLst>
+  </p:cSld>
+  <p:clrMapOvr>
+    <a:masterClrMapping/>
+  </p:clrMapOvr>
+  <p:transition spd="med">
+    <p:fade/>
+  </p:transition>
+  <p:timing>
+    <p:tnLst>
+      <p:par>
+        <p:cTn id="1" dur="indefinite" restart="never" nodeType="tmRoot"/>
+      </p:par>
+    </p:tnLst>
+  </p:timing>
+</p:sld>
+</file>
+
+<file path=ppt/slides/slide25.xml><?xml version="1.0" encoding="utf-8"?>
 <p:sld xmlns:a="http://schemas.openxmlformats.org/drawingml/2006/main" xmlns:r="http://schemas.openxmlformats.org/officeDocument/2006/relationships" xmlns:p="http://schemas.openxmlformats.org/presentationml/2006/main">
   <p:cSld>
     <p:bg>
@@ -13345,10 +13635,17 @@
   <p:transition spd="med">
     <p:fade/>
   </p:transition>
+  <p:timing>
+    <p:tnLst>
+      <p:par>
+        <p:cTn id="1" dur="indefinite" restart="never" nodeType="tmRoot"/>
+      </p:par>
+    </p:tnLst>
+  </p:timing>
 </p:sld>
 </file>
 
-<file path=ppt/slides/slide25.xml><?xml version="1.0" encoding="utf-8"?>
+<file path=ppt/slides/slide26.xml><?xml version="1.0" encoding="utf-8"?>
 <p:sld xmlns:a="http://schemas.openxmlformats.org/drawingml/2006/main" xmlns:r="http://schemas.openxmlformats.org/officeDocument/2006/relationships" xmlns:p="http://schemas.openxmlformats.org/presentationml/2006/main">
   <p:cSld>
     <p:spTree>
@@ -13539,6 +13836,13 @@
   <p:transition spd="med">
     <p:fade/>
   </p:transition>
+  <p:timing>
+    <p:tnLst>
+      <p:par>
+        <p:cTn id="1" dur="indefinite" restart="never" nodeType="tmRoot"/>
+      </p:par>
+    </p:tnLst>
+  </p:timing>
 </p:sld>
 </file>
 
@@ -13907,13 +14211,8 @@
             </a:pPr>
             <a:r>
               <a:rPr lang="en-US" dirty="0" smtClean="0"/>
-              <a:t>View the scan output</a:t>
-            </a:r>
-            <a:r>
-              <a:rPr lang="en-US" dirty="0" smtClean="0"/>
-              <a:t>.</a:t>
-            </a:r>
-            <a:endParaRPr lang="en-US" dirty="0" smtClean="0"/>
+              <a:t>View the scan output.</a:t>
+            </a:r>
           </a:p>
         </p:txBody>
       </p:sp>
@@ -13930,6 +14229,13 @@
   <p:transition spd="med">
     <p:fade/>
   </p:transition>
+  <p:timing>
+    <p:tnLst>
+      <p:par>
+        <p:cTn id="1" dur="indefinite" restart="never" nodeType="tmRoot"/>
+      </p:par>
+    </p:tnLst>
+  </p:timing>
 </p:sld>
 </file>
 
@@ -14073,6 +14379,13 @@
   <p:transition spd="med">
     <p:fade/>
   </p:transition>
+  <p:timing>
+    <p:tnLst>
+      <p:par>
+        <p:cTn id="1" dur="indefinite" restart="never" nodeType="tmRoot"/>
+      </p:par>
+    </p:tnLst>
+  </p:timing>
 </p:sld>
 </file>
 
@@ -14224,6 +14537,13 @@
   <p:transition spd="med">
     <p:fade/>
   </p:transition>
+  <p:timing>
+    <p:tnLst>
+      <p:par>
+        <p:cTn id="1" dur="indefinite" restart="never" nodeType="tmRoot"/>
+      </p:par>
+    </p:tnLst>
+  </p:timing>
 </p:sld>
 </file>
 
@@ -14403,6 +14723,13 @@
   <p:transition spd="med">
     <p:fade/>
   </p:transition>
+  <p:timing>
+    <p:tnLst>
+      <p:par>
+        <p:cTn id="1" dur="indefinite" restart="never" nodeType="tmRoot"/>
+      </p:par>
+    </p:tnLst>
+  </p:timing>
 </p:sld>
 </file>
 
@@ -14493,7 +14820,7 @@
           <p:nvPr/>
         </p:nvPicPr>
         <p:blipFill>
-          <a:blip r:embed="rId2"/>
+          <a:blip r:embed="rId3"/>
           <a:stretch>
             <a:fillRect/>
           </a:stretch>
@@ -14526,6 +14853,13 @@
   <p:transition spd="med">
     <p:fade/>
   </p:transition>
+  <p:timing>
+    <p:tnLst>
+      <p:par>
+        <p:cTn id="1" dur="indefinite" restart="never" nodeType="tmRoot"/>
+      </p:par>
+    </p:tnLst>
+  </p:timing>
 </p:sld>
 </file>
 
@@ -15860,6 +16194,18 @@
 </file>
 
 <file path=customXml/item1.xml><?xml version="1.0" encoding="utf-8"?>
+<p:properties xmlns:p="http://schemas.microsoft.com/office/2006/metadata/properties" xmlns:xsi="http://www.w3.org/2001/XMLSchema-instance" xmlns:pc="http://schemas.microsoft.com/office/infopath/2007/PartnerControls">
+  <documentManagement>
+    <_dlc_DocId xmlns="7bb5d761-a2ea-4873-95f7-7a6658fb3ef0">M4CWTKMW727E-592-73</_dlc_DocId>
+    <_dlc_DocIdUrl xmlns="7bb5d761-a2ea-4873-95f7-7a6658fb3ef0">
+      <Url>https://kms.vci.local/marketing/team/_layouts/DocIdRedir.aspx?ID=M4CWTKMW727E-592-73</Url>
+      <Description>M4CWTKMW727E-592-73</Description>
+    </_dlc_DocIdUrl>
+  </documentManagement>
+</p:properties>
+</file>
+
+<file path=customXml/item2.xml><?xml version="1.0" encoding="utf-8"?>
 <ct:contentTypeSchema xmlns:ct="http://schemas.microsoft.com/office/2006/metadata/contentType" xmlns:ma="http://schemas.microsoft.com/office/2006/metadata/properties/metaAttributes" ct:_="" ma:_="" ma:contentTypeName="Document" ma:contentTypeID="0x0101000812F700BE7F874999720E88173FE491" ma:contentTypeVersion="0" ma:contentTypeDescription="Create a new document." ma:contentTypeScope="" ma:versionID="3f79f408e2ca720b7aba6e0e32464d0c">
   <xsd:schema xmlns:xsd="http://www.w3.org/2001/XMLSchema" xmlns:xs="http://www.w3.org/2001/XMLSchema" xmlns:p="http://schemas.microsoft.com/office/2006/metadata/properties" xmlns:ns2="7bb5d761-a2ea-4873-95f7-7a6658fb3ef0" targetNamespace="http://schemas.microsoft.com/office/2006/metadata/properties" ma:root="true" ma:fieldsID="1e062cd38ba31e406bfc4340fbc7f87a" ns2:_="">
     <xsd:import namespace="7bb5d761-a2ea-4873-95f7-7a6658fb3ef0"/>
@@ -16004,7 +16350,7 @@
 </ct:contentTypeSchema>
 </file>
 
-<file path=customXml/item2.xml><?xml version="1.0" encoding="utf-8"?>
+<file path=customXml/item3.xml><?xml version="1.0" encoding="utf-8"?>
 <?mso-contentType ?>
 <spe:Receivers xmlns:spe="http://schemas.microsoft.com/sharepoint/events">
   <Receiver>
@@ -16050,7 +16396,7 @@
 </spe:Receivers>
 </file>
 
-<file path=customXml/item3.xml><?xml version="1.0" encoding="utf-8"?>
+<file path=customXml/item4.xml><?xml version="1.0" encoding="utf-8"?>
 <?mso-contentType ?>
 <FormTemplates xmlns="http://schemas.microsoft.com/sharepoint/v3/contenttype/forms">
   <Display>DocumentLibraryForm</Display>
@@ -16059,19 +16405,23 @@
 </FormTemplates>
 </file>
 
-<file path=customXml/item4.xml><?xml version="1.0" encoding="utf-8"?>
-<p:properties xmlns:p="http://schemas.microsoft.com/office/2006/metadata/properties" xmlns:xsi="http://www.w3.org/2001/XMLSchema-instance" xmlns:pc="http://schemas.microsoft.com/office/infopath/2007/PartnerControls">
-  <documentManagement>
-    <_dlc_DocId xmlns="7bb5d761-a2ea-4873-95f7-7a6658fb3ef0">M4CWTKMW727E-592-73</_dlc_DocId>
-    <_dlc_DocIdUrl xmlns="7bb5d761-a2ea-4873-95f7-7a6658fb3ef0">
-      <Url>https://kms.vci.local/marketing/team/_layouts/DocIdRedir.aspx?ID=M4CWTKMW727E-592-73</Url>
-      <Description>M4CWTKMW727E-592-73</Description>
-    </_dlc_DocIdUrl>
-  </documentManagement>
-</p:properties>
+<file path=customXml/itemProps1.xml><?xml version="1.0" encoding="utf-8"?>
+<ds:datastoreItem xmlns:ds="http://schemas.openxmlformats.org/officeDocument/2006/customXml" ds:itemID="{6921749B-AEB7-461B-845F-603CABD25259}">
+  <ds:schemaRefs>
+    <ds:schemaRef ds:uri="http://schemas.microsoft.com/office/2006/documentManagement/types"/>
+    <ds:schemaRef ds:uri="http://schemas.microsoft.com/office/infopath/2007/PartnerControls"/>
+    <ds:schemaRef ds:uri="http://purl.org/dc/elements/1.1/"/>
+    <ds:schemaRef ds:uri="http://schemas.microsoft.com/office/2006/metadata/properties"/>
+    <ds:schemaRef ds:uri="7bb5d761-a2ea-4873-95f7-7a6658fb3ef0"/>
+    <ds:schemaRef ds:uri="http://purl.org/dc/terms/"/>
+    <ds:schemaRef ds:uri="http://schemas.openxmlformats.org/package/2006/metadata/core-properties"/>
+    <ds:schemaRef ds:uri="http://www.w3.org/XML/1998/namespace"/>
+    <ds:schemaRef ds:uri="http://purl.org/dc/dcmitype/"/>
+  </ds:schemaRefs>
+</ds:datastoreItem>
 </file>
 
-<file path=customXml/itemProps1.xml><?xml version="1.0" encoding="utf-8"?>
+<file path=customXml/itemProps2.xml><?xml version="1.0" encoding="utf-8"?>
 <ds:datastoreItem xmlns:ds="http://schemas.openxmlformats.org/officeDocument/2006/customXml" ds:itemID="{164479E5-0B02-49AC-B79E-EC1D6164DDD3}">
   <ds:schemaRefs>
     <ds:schemaRef ds:uri="http://schemas.microsoft.com/office/2006/metadata/contentType"/>
@@ -16089,7 +16439,7 @@
 </ds:datastoreItem>
 </file>
 
-<file path=customXml/itemProps2.xml><?xml version="1.0" encoding="utf-8"?>
+<file path=customXml/itemProps3.xml><?xml version="1.0" encoding="utf-8"?>
 <ds:datastoreItem xmlns:ds="http://schemas.openxmlformats.org/officeDocument/2006/customXml" ds:itemID="{B13EBC30-FE27-4C6A-B723-23FC2188F7DC}">
   <ds:schemaRefs>
     <ds:schemaRef ds:uri="http://schemas.microsoft.com/sharepoint/events"/>
@@ -16097,26 +16447,10 @@
 </ds:datastoreItem>
 </file>
 
-<file path=customXml/itemProps3.xml><?xml version="1.0" encoding="utf-8"?>
+<file path=customXml/itemProps4.xml><?xml version="1.0" encoding="utf-8"?>
 <ds:datastoreItem xmlns:ds="http://schemas.openxmlformats.org/officeDocument/2006/customXml" ds:itemID="{5CDEB364-43EC-4510-9881-539C2A3FCE9E}">
   <ds:schemaRefs>
     <ds:schemaRef ds:uri="http://schemas.microsoft.com/sharepoint/v3/contenttype/forms"/>
   </ds:schemaRefs>
 </ds:datastoreItem>
-</file>
-
-<file path=customXml/itemProps4.xml><?xml version="1.0" encoding="utf-8"?>
-<ds:datastoreItem xmlns:ds="http://schemas.openxmlformats.org/officeDocument/2006/customXml" ds:itemID="{6921749B-AEB7-461B-845F-603CABD25259}">
-  <ds:schemaRefs>
-    <ds:schemaRef ds:uri="http://schemas.microsoft.com/office/2006/documentManagement/types"/>
-    <ds:schemaRef ds:uri="http://schemas.microsoft.com/office/infopath/2007/PartnerControls"/>
-    <ds:schemaRef ds:uri="http://purl.org/dc/elements/1.1/"/>
-    <ds:schemaRef ds:uri="http://schemas.microsoft.com/office/2006/metadata/properties"/>
-    <ds:schemaRef ds:uri="7bb5d761-a2ea-4873-95f7-7a6658fb3ef0"/>
-    <ds:schemaRef ds:uri="http://purl.org/dc/terms/"/>
-    <ds:schemaRef ds:uri="http://schemas.openxmlformats.org/package/2006/metadata/core-properties"/>
-    <ds:schemaRef ds:uri="http://www.w3.org/XML/1998/namespace"/>
-    <ds:schemaRef ds:uri="http://purl.org/dc/dcmitype/"/>
-  </ds:schemaRefs>
-</ds:datastoreItem>
 </file>
</xml_diff>

<commit_message>
07-scheduling-scans-reports replaced a number of screnshots with more accurate screenshots
</commit_message>
<xml_diff>
--- a/07-scheduling-scans-reports.pptx
+++ b/07-scheduling-scans-reports.pptx
@@ -299,7 +299,7 @@
               <a:pPr>
                 <a:defRPr/>
               </a:pPr>
-              <a:t>2016-02-04</a:t>
+              <a:t>2016-02-10</a:t>
             </a:fld>
             <a:endParaRPr lang="en-US" dirty="0"/>
           </a:p>
@@ -482,7 +482,7 @@
               <a:pPr>
                 <a:defRPr/>
               </a:pPr>
-              <a:t>2016-02-04</a:t>
+              <a:t>2016-02-10</a:t>
             </a:fld>
             <a:endParaRPr lang="en-US" dirty="0"/>
           </a:p>
@@ -1823,29 +1823,6 @@
             <a:endParaRPr lang="en-US" dirty="0" smtClean="0"/>
           </a:p>
           <a:p>
-            <a:pPr marL="0" marR="0" indent="0" algn="l" defTabSz="1217613" rtl="0" eaLnBrk="1" fontAlgn="base" latinLnBrk="0" hangingPunct="1">
-              <a:lnSpc>
-                <a:spcPct val="90000"/>
-              </a:lnSpc>
-              <a:spcBef>
-                <a:spcPct val="30000"/>
-              </a:spcBef>
-              <a:spcAft>
-                <a:spcPts val="450"/>
-              </a:spcAft>
-              <a:buClrTx/>
-              <a:buSzTx/>
-              <a:buFontTx/>
-              <a:buNone/>
-              <a:tabLst/>
-              <a:defRPr/>
-            </a:pPr>
-            <a:r>
-              <a:rPr lang="en-US" dirty="0" smtClean="0"/>
-              <a:t>TBD: Demo this via a slide.</a:t>
-            </a:r>
-          </a:p>
-          <a:p>
             <a:endParaRPr lang="en-US" dirty="0" smtClean="0"/>
           </a:p>
           <a:p>
@@ -1983,14 +1960,6 @@
           <a:bodyPr/>
           <a:lstStyle/>
           <a:p>
-            <a:r>
-              <a:rPr lang="en-US" dirty="0" err="1" smtClean="0"/>
-              <a:t>tbd</a:t>
-            </a:r>
-            <a:r>
-              <a:rPr lang="en-US" dirty="0" smtClean="0"/>
-              <a:t>-update screen with name defined.</a:t>
-            </a:r>
             <a:endParaRPr lang="en-US" dirty="0"/>
           </a:p>
         </p:txBody>
@@ -2125,10 +2094,6 @@
           <a:bodyPr/>
           <a:lstStyle/>
           <a:p>
-            <a:r>
-              <a:rPr lang="en-US" dirty="0" smtClean="0"/>
-              <a:t>TBD Delete button after click.</a:t>
-            </a:r>
             <a:endParaRPr lang="en-US" dirty="0"/>
           </a:p>
         </p:txBody>
@@ -3472,14 +3437,14 @@
           </a:ln>
           <a:extLst>
             <a:ext uri="{909E8E84-426E-40dd-AFC4-6F175D3DCCD1}">
-              <a14:hiddenFill xmlns="" xmlns:a14="http://schemas.microsoft.com/office/drawing/2010/main">
+              <a14:hiddenFill xmlns:a14="http://schemas.microsoft.com/office/drawing/2010/main" xmlns="">
                 <a:solidFill>
                   <a:srgbClr val="FFFFFF"/>
                 </a:solidFill>
               </a14:hiddenFill>
             </a:ext>
             <a:ext uri="{91240B29-F687-4f45-9708-019B960494DF}">
-              <a14:hiddenLine xmlns="" xmlns:a14="http://schemas.microsoft.com/office/drawing/2010/main" w="9525">
+              <a14:hiddenLine xmlns:a14="http://schemas.microsoft.com/office/drawing/2010/main" xmlns="" w="9525">
                 <a:solidFill>
                   <a:srgbClr val="000000"/>
                 </a:solidFill>
@@ -3627,14 +3592,14 @@
           </a:ln>
           <a:extLst>
             <a:ext uri="{909E8E84-426E-40dd-AFC4-6F175D3DCCD1}">
-              <a14:hiddenFill xmlns="" xmlns:a14="http://schemas.microsoft.com/office/drawing/2010/main">
+              <a14:hiddenFill xmlns:a14="http://schemas.microsoft.com/office/drawing/2010/main" xmlns="">
                 <a:solidFill>
                   <a:srgbClr val="FFFFFF"/>
                 </a:solidFill>
               </a14:hiddenFill>
             </a:ext>
             <a:ext uri="{91240B29-F687-4f45-9708-019B960494DF}">
-              <a14:hiddenLine xmlns="" xmlns:a14="http://schemas.microsoft.com/office/drawing/2010/main" w="9525">
+              <a14:hiddenLine xmlns:a14="http://schemas.microsoft.com/office/drawing/2010/main" xmlns="" w="9525">
                 <a:solidFill>
                   <a:srgbClr val="000000"/>
                 </a:solidFill>
@@ -4125,14 +4090,14 @@
           </a:ln>
           <a:extLst>
             <a:ext uri="{909E8E84-426E-40dd-AFC4-6F175D3DCCD1}">
-              <a14:hiddenFill xmlns="" xmlns:a14="http://schemas.microsoft.com/office/drawing/2010/main">
+              <a14:hiddenFill xmlns:a14="http://schemas.microsoft.com/office/drawing/2010/main" xmlns="">
                 <a:solidFill>
                   <a:srgbClr val="FFFFFF"/>
                 </a:solidFill>
               </a14:hiddenFill>
             </a:ext>
             <a:ext uri="{91240B29-F687-4f45-9708-019B960494DF}">
-              <a14:hiddenLine xmlns="" xmlns:a14="http://schemas.microsoft.com/office/drawing/2010/main" w="9525">
+              <a14:hiddenLine xmlns:a14="http://schemas.microsoft.com/office/drawing/2010/main" xmlns="" w="9525">
                 <a:solidFill>
                   <a:srgbClr val="000000"/>
                 </a:solidFill>
@@ -4371,14 +4336,14 @@
           </a:ln>
           <a:extLst>
             <a:ext uri="{909E8E84-426E-40dd-AFC4-6F175D3DCCD1}">
-              <a14:hiddenFill xmlns="" xmlns:a14="http://schemas.microsoft.com/office/drawing/2010/main">
+              <a14:hiddenFill xmlns:a14="http://schemas.microsoft.com/office/drawing/2010/main" xmlns="">
                 <a:solidFill>
                   <a:srgbClr val="FFFFFF"/>
                 </a:solidFill>
               </a14:hiddenFill>
             </a:ext>
             <a:ext uri="{91240B29-F687-4f45-9708-019B960494DF}">
-              <a14:hiddenLine xmlns="" xmlns:a14="http://schemas.microsoft.com/office/drawing/2010/main" w="9525">
+              <a14:hiddenLine xmlns:a14="http://schemas.microsoft.com/office/drawing/2010/main" xmlns="" w="9525">
                 <a:solidFill>
                   <a:srgbClr val="000000"/>
                 </a:solidFill>
@@ -6002,14 +5967,14 @@
           </a:ln>
           <a:extLst>
             <a:ext uri="{909E8E84-426E-40dd-AFC4-6F175D3DCCD1}">
-              <a14:hiddenFill xmlns="" xmlns:a14="http://schemas.microsoft.com/office/drawing/2010/main">
+              <a14:hiddenFill xmlns:a14="http://schemas.microsoft.com/office/drawing/2010/main" xmlns="">
                 <a:solidFill>
                   <a:srgbClr val="FFFFFF"/>
                 </a:solidFill>
               </a14:hiddenFill>
             </a:ext>
             <a:ext uri="{91240B29-F687-4f45-9708-019B960494DF}">
-              <a14:hiddenLine xmlns="" xmlns:a14="http://schemas.microsoft.com/office/drawing/2010/main" w="9525">
+              <a14:hiddenLine xmlns:a14="http://schemas.microsoft.com/office/drawing/2010/main" xmlns="" w="9525">
                 <a:solidFill>
                   <a:srgbClr val="000000"/>
                 </a:solidFill>
@@ -7543,14 +7508,14 @@
           </a:ln>
           <a:extLst>
             <a:ext uri="{909E8E84-426E-40dd-AFC4-6F175D3DCCD1}">
-              <a14:hiddenFill xmlns="" xmlns:a14="http://schemas.microsoft.com/office/drawing/2010/main">
+              <a14:hiddenFill xmlns:a14="http://schemas.microsoft.com/office/drawing/2010/main" xmlns="">
                 <a:solidFill>
                   <a:srgbClr val="FFFFFF"/>
                 </a:solidFill>
               </a14:hiddenFill>
             </a:ext>
             <a:ext uri="{91240B29-F687-4f45-9708-019B960494DF}">
-              <a14:hiddenLine xmlns="" xmlns:a14="http://schemas.microsoft.com/office/drawing/2010/main" w="9525">
+              <a14:hiddenLine xmlns:a14="http://schemas.microsoft.com/office/drawing/2010/main" xmlns="" w="9525">
                 <a:solidFill>
                   <a:srgbClr val="000000"/>
                 </a:solidFill>
@@ -8056,14 +8021,14 @@
           </a:ln>
           <a:extLst>
             <a:ext uri="{909E8E84-426E-40dd-AFC4-6F175D3DCCD1}">
-              <a14:hiddenFill xmlns="" xmlns:a14="http://schemas.microsoft.com/office/drawing/2010/main">
+              <a14:hiddenFill xmlns:a14="http://schemas.microsoft.com/office/drawing/2010/main" xmlns="">
                 <a:solidFill>
                   <a:srgbClr val="FFFFFF"/>
                 </a:solidFill>
               </a14:hiddenFill>
             </a:ext>
             <a:ext uri="{91240B29-F687-4f45-9708-019B960494DF}">
-              <a14:hiddenLine xmlns="" xmlns:a14="http://schemas.microsoft.com/office/drawing/2010/main" w="9525">
+              <a14:hiddenLine xmlns:a14="http://schemas.microsoft.com/office/drawing/2010/main" xmlns="" w="9525">
                 <a:solidFill>
                   <a:srgbClr val="000000"/>
                 </a:solidFill>
@@ -8630,14 +8595,14 @@
           </a:ln>
           <a:extLst>
             <a:ext uri="{909E8E84-426E-40dd-AFC4-6F175D3DCCD1}">
-              <a14:hiddenFill xmlns="" xmlns:a14="http://schemas.microsoft.com/office/drawing/2010/main">
+              <a14:hiddenFill xmlns:a14="http://schemas.microsoft.com/office/drawing/2010/main" xmlns="">
                 <a:solidFill>
                   <a:srgbClr val="FFFFFF"/>
                 </a:solidFill>
               </a14:hiddenFill>
             </a:ext>
             <a:ext uri="{91240B29-F687-4f45-9708-019B960494DF}">
-              <a14:hiddenLine xmlns="" xmlns:a14="http://schemas.microsoft.com/office/drawing/2010/main" w="9525">
+              <a14:hiddenLine xmlns:a14="http://schemas.microsoft.com/office/drawing/2010/main" xmlns="" w="9525">
                 <a:solidFill>
                   <a:srgbClr val="000000"/>
                 </a:solidFill>
@@ -9577,14 +9542,14 @@
           </a:ln>
           <a:extLst>
             <a:ext uri="{909E8E84-426E-40dd-AFC4-6F175D3DCCD1}">
-              <a14:hiddenFill xmlns="" xmlns:a14="http://schemas.microsoft.com/office/drawing/2010/main">
+              <a14:hiddenFill xmlns:a14="http://schemas.microsoft.com/office/drawing/2010/main" xmlns="">
                 <a:solidFill>
                   <a:srgbClr val="FFFFFF"/>
                 </a:solidFill>
               </a14:hiddenFill>
             </a:ext>
             <a:ext uri="{91240B29-F687-4f45-9708-019B960494DF}">
-              <a14:hiddenLine xmlns="" xmlns:a14="http://schemas.microsoft.com/office/drawing/2010/main" w="9525">
+              <a14:hiddenLine xmlns:a14="http://schemas.microsoft.com/office/drawing/2010/main" xmlns="" w="9525">
                 <a:solidFill>
                   <a:srgbClr val="000000"/>
                 </a:solidFill>
@@ -10336,14 +10301,14 @@
           </a:ln>
           <a:extLst>
             <a:ext uri="{909E8E84-426E-40dd-AFC4-6F175D3DCCD1}">
-              <a14:hiddenFill xmlns="" xmlns:a14="http://schemas.microsoft.com/office/drawing/2010/main">
+              <a14:hiddenFill xmlns:a14="http://schemas.microsoft.com/office/drawing/2010/main" xmlns="">
                 <a:solidFill>
                   <a:srgbClr val="FFFFFF"/>
                 </a:solidFill>
               </a14:hiddenFill>
             </a:ext>
             <a:ext uri="{91240B29-F687-4f45-9708-019B960494DF}">
-              <a14:hiddenLine xmlns="" xmlns:a14="http://schemas.microsoft.com/office/drawing/2010/main" w="9525">
+              <a14:hiddenLine xmlns:a14="http://schemas.microsoft.com/office/drawing/2010/main" xmlns="" w="9525">
                 <a:solidFill>
                   <a:srgbClr val="000000"/>
                 </a:solidFill>
@@ -11219,8 +11184,8 @@
         </p:nvSpPr>
         <p:spPr>
           <a:xfrm>
-            <a:off x="650040" y="1856198"/>
-            <a:ext cx="5785266" cy="5345953"/>
+            <a:off x="650039" y="1602199"/>
+            <a:ext cx="14780461" cy="1304288"/>
           </a:xfrm>
         </p:spPr>
         <p:txBody>
@@ -11229,29 +11194,13 @@
           <a:p>
             <a:r>
               <a:rPr lang="en-US" dirty="0" smtClean="0"/>
-              <a:t>When 5 minutes have elapsed, refresh your browser and you should see that your Job's status is now "done".</a:t>
-            </a:r>
-          </a:p>
-          <a:p>
-            <a:endParaRPr lang="en-US" dirty="0"/>
-          </a:p>
-          <a:p>
-            <a:r>
-              <a:rPr lang="en-US" b="1" dirty="0" smtClean="0"/>
-              <a:t>Note</a:t>
-            </a:r>
-            <a:r>
-              <a:rPr lang="en-US" dirty="0" smtClean="0"/>
-              <a:t>: If you like you could click that job to see its original details</a:t>
-            </a:r>
-            <a:r>
-              <a:rPr lang="en-US" dirty="0"/>
-              <a:t> </a:t>
-            </a:r>
-            <a:r>
-              <a:rPr lang="en-US" dirty="0" smtClean="0"/>
-              <a:t>that you set when you scheduled it.</a:t>
-            </a:r>
+              <a:t>When 5 minutes have elapsed, refresh your browser and you should see that your Job's status is now "done</a:t>
+            </a:r>
+            <a:r>
+              <a:rPr lang="en-US" dirty="0" smtClean="0"/>
+              <a:t>".</a:t>
+            </a:r>
+            <a:endParaRPr lang="en-US" dirty="0" smtClean="0"/>
           </a:p>
           <a:p>
             <a:endParaRPr lang="en-US" dirty="0"/>
@@ -11260,7 +11209,7 @@
       </p:sp>
       <p:pic>
         <p:nvPicPr>
-          <p:cNvPr id="7" name="Picture 6"/>
+          <p:cNvPr id="5" name="Picture 4"/>
           <p:cNvPicPr>
             <a:picLocks noChangeAspect="1"/>
           </p:cNvPicPr>
@@ -11274,8 +11223,8 @@
         </p:blipFill>
         <p:spPr>
           <a:xfrm>
-            <a:off x="6829517" y="1856198"/>
-            <a:ext cx="8715283" cy="2163711"/>
+            <a:off x="1735782" y="3307443"/>
+            <a:ext cx="12784437" cy="2530929"/>
           </a:xfrm>
           <a:prstGeom prst="rect">
             <a:avLst/>
@@ -11287,6 +11236,240 @@
           </a:ln>
         </p:spPr>
       </p:pic>
+      <p:sp>
+        <p:nvSpPr>
+          <p:cNvPr id="8" name="Text Placeholder 2"/>
+          <p:cNvSpPr txBox="1">
+            <a:spLocks/>
+          </p:cNvSpPr>
+          <p:nvPr/>
+        </p:nvSpPr>
+        <p:spPr bwMode="white">
+          <a:xfrm>
+            <a:off x="904039" y="6605814"/>
+            <a:ext cx="14780461" cy="1167755"/>
+          </a:xfrm>
+          <a:prstGeom prst="rect">
+            <a:avLst/>
+          </a:prstGeom>
+        </p:spPr>
+        <p:txBody>
+          <a:bodyPr vert="horz" wrap="square" lIns="0" tIns="0" rIns="0" bIns="0" rtlCol="0">
+            <a:noAutofit/>
+          </a:bodyPr>
+          <a:lstStyle>
+            <a:lvl1pPr algn="l" defTabSz="1217613" rtl="0" eaLnBrk="1" fontAlgn="base" hangingPunct="1">
+              <a:spcBef>
+                <a:spcPts val="800"/>
+              </a:spcBef>
+              <a:spcAft>
+                <a:spcPts val="800"/>
+              </a:spcAft>
+              <a:buSzPct val="90000"/>
+              <a:buFont typeface="Arial" charset="0"/>
+              <a:defRPr sz="3200" kern="1200" baseline="0">
+                <a:solidFill>
+                  <a:schemeClr val="accent3">
+                    <a:lumMod val="50000"/>
+                  </a:schemeClr>
+                </a:solidFill>
+                <a:latin typeface="+mn-lt"/>
+                <a:ea typeface="ＭＳ Ｐゴシック" charset="0"/>
+                <a:cs typeface="ＭＳ Ｐゴシック" charset="0"/>
+              </a:defRPr>
+            </a:lvl1pPr>
+            <a:lvl2pPr marL="307975" algn="l" defTabSz="1217613" rtl="0" eaLnBrk="1" fontAlgn="base" hangingPunct="1">
+              <a:spcBef>
+                <a:spcPts val="800"/>
+              </a:spcBef>
+              <a:spcAft>
+                <a:spcPts val="800"/>
+              </a:spcAft>
+              <a:buSzPct val="90000"/>
+              <a:buFont typeface="Arial" charset="0"/>
+              <a:defRPr sz="2800" kern="1200" baseline="0">
+                <a:solidFill>
+                  <a:schemeClr val="accent3">
+                    <a:lumMod val="50000"/>
+                  </a:schemeClr>
+                </a:solidFill>
+                <a:latin typeface="+mn-lt"/>
+                <a:ea typeface="ＭＳ Ｐゴシック" charset="0"/>
+                <a:cs typeface="+mn-cs"/>
+              </a:defRPr>
+            </a:lvl2pPr>
+            <a:lvl3pPr marL="608013" algn="l" defTabSz="1217613" rtl="0" eaLnBrk="1" fontAlgn="base" hangingPunct="1">
+              <a:spcBef>
+                <a:spcPts val="800"/>
+              </a:spcBef>
+              <a:spcAft>
+                <a:spcPts val="800"/>
+              </a:spcAft>
+              <a:buSzPct val="90000"/>
+              <a:buFont typeface="Arial" charset="0"/>
+              <a:defRPr sz="2400" kern="1200" baseline="0">
+                <a:solidFill>
+                  <a:schemeClr val="accent3">
+                    <a:lumMod val="50000"/>
+                  </a:schemeClr>
+                </a:solidFill>
+                <a:latin typeface="+mn-lt"/>
+                <a:ea typeface="ＭＳ Ｐゴシック" charset="0"/>
+                <a:cs typeface="+mn-cs"/>
+              </a:defRPr>
+            </a:lvl3pPr>
+            <a:lvl4pPr marL="839788" algn="l" defTabSz="1217613" rtl="0" eaLnBrk="1" fontAlgn="base" hangingPunct="1">
+              <a:spcBef>
+                <a:spcPts val="800"/>
+              </a:spcBef>
+              <a:spcAft>
+                <a:spcPts val="800"/>
+              </a:spcAft>
+              <a:buSzPct val="90000"/>
+              <a:buFont typeface="Arial" charset="0"/>
+              <a:defRPr sz="2400" kern="1200" baseline="0">
+                <a:solidFill>
+                  <a:schemeClr val="accent3">
+                    <a:lumMod val="50000"/>
+                  </a:schemeClr>
+                </a:solidFill>
+                <a:latin typeface="+mn-lt"/>
+                <a:ea typeface="ＭＳ Ｐゴシック" charset="0"/>
+                <a:cs typeface="+mn-cs"/>
+              </a:defRPr>
+            </a:lvl4pPr>
+            <a:lvl5pPr marL="1068388" algn="l" defTabSz="1217613" rtl="0" eaLnBrk="1" fontAlgn="base" hangingPunct="1">
+              <a:spcBef>
+                <a:spcPts val="800"/>
+              </a:spcBef>
+              <a:spcAft>
+                <a:spcPts val="800"/>
+              </a:spcAft>
+              <a:buSzPct val="90000"/>
+              <a:buFont typeface="Arial" charset="0"/>
+              <a:defRPr sz="2000" kern="1200" baseline="0">
+                <a:solidFill>
+                  <a:schemeClr val="accent3">
+                    <a:lumMod val="50000"/>
+                  </a:schemeClr>
+                </a:solidFill>
+                <a:latin typeface="+mn-lt"/>
+                <a:ea typeface="ＭＳ Ｐゴシック" charset="0"/>
+                <a:cs typeface="+mn-cs"/>
+              </a:defRPr>
+            </a:lvl5pPr>
+            <a:lvl6pPr marL="3352582" indent="-304780" algn="l" defTabSz="1219120" rtl="0" eaLnBrk="1" latinLnBrk="0" hangingPunct="1">
+              <a:spcBef>
+                <a:spcPct val="20000"/>
+              </a:spcBef>
+              <a:buFont typeface="Arial" pitchFamily="34" charset="0"/>
+              <a:buChar char="•"/>
+              <a:defRPr sz="2667" kern="1200">
+                <a:solidFill>
+                  <a:schemeClr val="tx1"/>
+                </a:solidFill>
+                <a:latin typeface="+mn-lt"/>
+                <a:ea typeface="+mn-ea"/>
+                <a:cs typeface="+mn-cs"/>
+              </a:defRPr>
+            </a:lvl6pPr>
+            <a:lvl7pPr marL="3962142" indent="-304780" algn="l" defTabSz="1219120" rtl="0" eaLnBrk="1" latinLnBrk="0" hangingPunct="1">
+              <a:spcBef>
+                <a:spcPct val="20000"/>
+              </a:spcBef>
+              <a:buFont typeface="Arial" pitchFamily="34" charset="0"/>
+              <a:buChar char="•"/>
+              <a:defRPr sz="2667" kern="1200">
+                <a:solidFill>
+                  <a:schemeClr val="tx1"/>
+                </a:solidFill>
+                <a:latin typeface="+mn-lt"/>
+                <a:ea typeface="+mn-ea"/>
+                <a:cs typeface="+mn-cs"/>
+              </a:defRPr>
+            </a:lvl7pPr>
+            <a:lvl8pPr marL="4571703" indent="-304780" algn="l" defTabSz="1219120" rtl="0" eaLnBrk="1" latinLnBrk="0" hangingPunct="1">
+              <a:spcBef>
+                <a:spcPct val="20000"/>
+              </a:spcBef>
+              <a:buFont typeface="Arial" pitchFamily="34" charset="0"/>
+              <a:buChar char="•"/>
+              <a:defRPr sz="2667" kern="1200">
+                <a:solidFill>
+                  <a:schemeClr val="tx1"/>
+                </a:solidFill>
+                <a:latin typeface="+mn-lt"/>
+                <a:ea typeface="+mn-ea"/>
+                <a:cs typeface="+mn-cs"/>
+              </a:defRPr>
+            </a:lvl8pPr>
+            <a:lvl9pPr marL="5181264" indent="-304780" algn="l" defTabSz="1219120" rtl="0" eaLnBrk="1" latinLnBrk="0" hangingPunct="1">
+              <a:spcBef>
+                <a:spcPct val="20000"/>
+              </a:spcBef>
+              <a:buFont typeface="Arial" pitchFamily="34" charset="0"/>
+              <a:buChar char="•"/>
+              <a:defRPr sz="2667" kern="1200">
+                <a:solidFill>
+                  <a:schemeClr val="tx1"/>
+                </a:solidFill>
+                <a:latin typeface="+mn-lt"/>
+                <a:ea typeface="+mn-ea"/>
+                <a:cs typeface="+mn-cs"/>
+              </a:defRPr>
+            </a:lvl9pPr>
+          </a:lstStyle>
+          <a:p>
+            <a:r>
+              <a:rPr lang="en-US" b="1" dirty="0" smtClean="0"/>
+              <a:t>Note</a:t>
+            </a:r>
+            <a:r>
+              <a:rPr lang="en-US" dirty="0" smtClean="0"/>
+              <a:t>: If you like you could click that job to see its original details that you set when you scheduled it.</a:t>
+            </a:r>
+          </a:p>
+          <a:p>
+            <a:endParaRPr lang="en-US" dirty="0"/>
+          </a:p>
+        </p:txBody>
+      </p:sp>
+      <p:cxnSp>
+        <p:nvCxnSpPr>
+          <p:cNvPr id="9" name="Straight Arrow Connector 8"/>
+          <p:cNvCxnSpPr/>
+          <p:nvPr/>
+        </p:nvCxnSpPr>
+        <p:spPr>
+          <a:xfrm>
+            <a:off x="5631509" y="2341522"/>
+            <a:ext cx="7251734" cy="2231385"/>
+          </a:xfrm>
+          <a:prstGeom prst="straightConnector1">
+            <a:avLst/>
+          </a:prstGeom>
+          <a:ln>
+            <a:solidFill>
+              <a:schemeClr val="accent1"/>
+            </a:solidFill>
+            <a:tailEnd type="triangle"/>
+          </a:ln>
+        </p:spPr>
+        <p:style>
+          <a:lnRef idx="3">
+            <a:schemeClr val="accent1"/>
+          </a:lnRef>
+          <a:fillRef idx="0">
+            <a:schemeClr val="accent1"/>
+          </a:fillRef>
+          <a:effectRef idx="2">
+            <a:schemeClr val="accent1"/>
+          </a:effectRef>
+          <a:fontRef idx="minor">
+            <a:schemeClr val="tx1"/>
+          </a:fontRef>
+        </p:style>
+      </p:cxnSp>
     </p:spTree>
     <p:extLst>
       <p:ext uri="{BB962C8B-B14F-4D97-AF65-F5344CB8AC3E}">
@@ -11363,7 +11546,7 @@
         <p:spPr>
           <a:xfrm>
             <a:off x="650040" y="1856198"/>
-            <a:ext cx="5785266" cy="5345953"/>
+            <a:ext cx="15466260" cy="1017631"/>
           </a:xfrm>
         </p:spPr>
         <p:txBody>
@@ -11372,7 +11555,15 @@
           <a:p>
             <a:r>
               <a:rPr lang="en-US" dirty="0" smtClean="0"/>
-              <a:t>Click the Reports tab and then click the report from your scheduled scan. </a:t>
+              <a:t>Click the </a:t>
+            </a:r>
+            <a:r>
+              <a:rPr lang="en-US" b="1" dirty="0" smtClean="0"/>
+              <a:t>Reports</a:t>
+            </a:r>
+            <a:r>
+              <a:rPr lang="en-US" dirty="0" smtClean="0"/>
+              <a:t> tab and then click the report from your scheduled scan. </a:t>
             </a:r>
           </a:p>
           <a:p>
@@ -11382,7 +11573,7 @@
       </p:sp>
       <p:pic>
         <p:nvPicPr>
-          <p:cNvPr id="8" name="Picture 7"/>
+          <p:cNvPr id="4" name="Picture 3"/>
           <p:cNvPicPr>
             <a:picLocks noChangeAspect="1"/>
           </p:cNvPicPr>
@@ -11396,8 +11587,8 @@
         </p:blipFill>
         <p:spPr>
           <a:xfrm>
-            <a:off x="7096125" y="1609096"/>
-            <a:ext cx="8448675" cy="1752600"/>
+            <a:off x="1653186" y="3870251"/>
+            <a:ext cx="12949628" cy="2334161"/>
           </a:xfrm>
           <a:prstGeom prst="rect">
             <a:avLst/>
@@ -11504,7 +11695,7 @@
       </p:sp>
       <p:pic>
         <p:nvPicPr>
-          <p:cNvPr id="4" name="Picture 3"/>
+          <p:cNvPr id="5" name="Picture 4"/>
           <p:cNvPicPr>
             <a:picLocks noChangeAspect="1"/>
           </p:cNvPicPr>
@@ -11518,8 +11709,8 @@
         </p:blipFill>
         <p:spPr>
           <a:xfrm>
-            <a:off x="5325710" y="1623116"/>
-            <a:ext cx="10546894" cy="5781731"/>
+            <a:off x="4955743" y="1326243"/>
+            <a:ext cx="10886826" cy="6652568"/>
           </a:xfrm>
           <a:prstGeom prst="rect">
             <a:avLst/>
@@ -12361,7 +12552,7 @@
       </p:sp>
       <p:pic>
         <p:nvPicPr>
-          <p:cNvPr id="4" name="Picture 3"/>
+          <p:cNvPr id="7" name="Picture 6"/>
           <p:cNvPicPr>
             <a:picLocks noChangeAspect="1"/>
           </p:cNvPicPr>
@@ -12375,8 +12566,8 @@
         </p:blipFill>
         <p:spPr>
           <a:xfrm>
-            <a:off x="7957405" y="1448920"/>
-            <a:ext cx="7051567" cy="2872067"/>
+            <a:off x="6777317" y="1388995"/>
+            <a:ext cx="9005765" cy="2715171"/>
           </a:xfrm>
           <a:prstGeom prst="rect">
             <a:avLst/>
@@ -12390,7 +12581,7 @@
       </p:pic>
       <p:pic>
         <p:nvPicPr>
-          <p:cNvPr id="5" name="Picture 4"/>
+          <p:cNvPr id="8" name="Picture 7"/>
           <p:cNvPicPr>
             <a:picLocks noChangeAspect="1"/>
           </p:cNvPicPr>
@@ -12404,8 +12595,8 @@
         </p:blipFill>
         <p:spPr>
           <a:xfrm>
-            <a:off x="8625968" y="4636432"/>
-            <a:ext cx="5248275" cy="3190875"/>
+            <a:off x="8077200" y="4529174"/>
+            <a:ext cx="6391275" cy="3209925"/>
           </a:xfrm>
           <a:prstGeom prst="rect">
             <a:avLst/>
@@ -13427,11 +13618,7 @@
           <a:p>
             <a:r>
               <a:rPr lang="en-US" sz="2400" dirty="0" smtClean="0"/>
-              <a:t>TBD Add export API </a:t>
-            </a:r>
-            <a:r>
-              <a:rPr lang="en-US" sz="2400" dirty="0" smtClean="0"/>
-              <a:t>info</a:t>
+              <a:t>TBD Add export API info</a:t>
             </a:r>
           </a:p>
           <a:p>
@@ -13441,13 +13628,8 @@
             </a:r>
             <a:r>
               <a:rPr lang="en-US" sz="2400" dirty="0" smtClean="0"/>
-              <a:t>? </a:t>
-            </a:r>
-            <a:r>
-              <a:rPr lang="en-US" sz="2400" smtClean="0"/>
-              <a:t>yes.</a:t>
-            </a:r>
-            <a:endParaRPr lang="en-US" sz="2400" dirty="0" smtClean="0"/>
+              <a:t>? yes.</a:t>
+            </a:r>
           </a:p>
           <a:p>
             <a:endParaRPr lang="en-US" sz="2400" dirty="0"/>
@@ -14997,35 +15179,110 @@
           </a:p>
         </p:txBody>
       </p:sp>
-      <p:pic>
-        <p:nvPicPr>
-          <p:cNvPr id="6" name="Picture 5"/>
-          <p:cNvPicPr>
-            <a:picLocks noChangeAspect="1"/>
-          </p:cNvPicPr>
+      <p:grpSp>
+        <p:nvGrpSpPr>
+          <p:cNvPr id="17" name="Group 16"/>
+          <p:cNvGrpSpPr/>
           <p:nvPr/>
-        </p:nvPicPr>
-        <p:blipFill>
-          <a:blip r:embed="rId3"/>
-          <a:stretch>
-            <a:fillRect/>
-          </a:stretch>
-        </p:blipFill>
+        </p:nvGrpSpPr>
+        <p:grpSpPr>
+          <a:xfrm>
+            <a:off x="2443128" y="4767943"/>
+            <a:ext cx="12223696" cy="2895417"/>
+            <a:chOff x="2443128" y="4767943"/>
+            <a:chExt cx="12223696" cy="2895417"/>
+          </a:xfrm>
+        </p:grpSpPr>
+        <p:pic>
+          <p:nvPicPr>
+            <p:cNvPr id="13" name="Picture 12"/>
+            <p:cNvPicPr>
+              <a:picLocks noChangeAspect="1"/>
+            </p:cNvPicPr>
+            <p:nvPr/>
+          </p:nvPicPr>
+          <p:blipFill>
+            <a:blip r:embed="rId3"/>
+            <a:stretch>
+              <a:fillRect/>
+            </a:stretch>
+          </p:blipFill>
+          <p:spPr>
+            <a:xfrm>
+              <a:off x="2443128" y="4767943"/>
+              <a:ext cx="12223696" cy="2895417"/>
+            </a:xfrm>
+            <a:prstGeom prst="rect">
+              <a:avLst/>
+            </a:prstGeom>
+            <a:ln>
+              <a:solidFill>
+                <a:schemeClr val="accent1"/>
+              </a:solidFill>
+            </a:ln>
+          </p:spPr>
+        </p:pic>
+        <p:pic>
+          <p:nvPicPr>
+            <p:cNvPr id="14" name="Picture 13"/>
+            <p:cNvPicPr>
+              <a:picLocks noChangeAspect="1"/>
+            </p:cNvPicPr>
+            <p:nvPr/>
+          </p:nvPicPr>
+          <p:blipFill>
+            <a:blip r:embed="rId4"/>
+            <a:stretch>
+              <a:fillRect/>
+            </a:stretch>
+          </p:blipFill>
+          <p:spPr>
+            <a:xfrm>
+              <a:off x="5261393" y="7298226"/>
+              <a:ext cx="9026107" cy="277053"/>
+            </a:xfrm>
+            <a:prstGeom prst="rect">
+              <a:avLst/>
+            </a:prstGeom>
+          </p:spPr>
+        </p:pic>
+      </p:grpSp>
+      <p:cxnSp>
+        <p:nvCxnSpPr>
+          <p:cNvPr id="11" name="Straight Arrow Connector 10"/>
+          <p:cNvCxnSpPr/>
+          <p:nvPr/>
+        </p:nvCxnSpPr>
         <p:spPr>
           <a:xfrm>
-            <a:off x="6435306" y="2940520"/>
-            <a:ext cx="9433280" cy="2528627"/>
+            <a:off x="6366294" y="3396343"/>
+            <a:ext cx="7235406" cy="2664813"/>
           </a:xfrm>
-          <a:prstGeom prst="rect">
+          <a:prstGeom prst="straightConnector1">
             <a:avLst/>
           </a:prstGeom>
           <a:ln>
             <a:solidFill>
               <a:schemeClr val="accent1"/>
             </a:solidFill>
+            <a:tailEnd type="triangle"/>
           </a:ln>
         </p:spPr>
-      </p:pic>
+        <p:style>
+          <a:lnRef idx="3">
+            <a:schemeClr val="accent1"/>
+          </a:lnRef>
+          <a:fillRef idx="0">
+            <a:schemeClr val="accent1"/>
+          </a:fillRef>
+          <a:effectRef idx="2">
+            <a:schemeClr val="accent1"/>
+          </a:effectRef>
+          <a:fontRef idx="minor">
+            <a:schemeClr val="tx1"/>
+          </a:fontRef>
+        </p:style>
+      </p:cxnSp>
     </p:spTree>
     <p:extLst>
       <p:ext uri="{BB962C8B-B14F-4D97-AF65-F5344CB8AC3E}">
@@ -16381,6 +16638,15 @@
 
 <file path=customXml/item1.xml><?xml version="1.0" encoding="utf-8"?>
 <?mso-contentType ?>
+<FormTemplates xmlns="http://schemas.microsoft.com/sharepoint/v3/contenttype/forms">
+  <Display>DocumentLibraryForm</Display>
+  <Edit>DocumentLibraryForm</Edit>
+  <New>DocumentLibraryForm</New>
+</FormTemplates>
+</file>
+
+<file path=customXml/item2.xml><?xml version="1.0" encoding="utf-8"?>
+<?mso-contentType ?>
 <spe:Receivers xmlns:spe="http://schemas.microsoft.com/sharepoint/events">
   <Receiver>
     <Name>Document ID Generator</Name>
@@ -16425,28 +16691,7 @@
 </spe:Receivers>
 </file>
 
-<file path=customXml/item2.xml><?xml version="1.0" encoding="utf-8"?>
-<?mso-contentType ?>
-<FormTemplates xmlns="http://schemas.microsoft.com/sharepoint/v3/contenttype/forms">
-  <Display>DocumentLibraryForm</Display>
-  <Edit>DocumentLibraryForm</Edit>
-  <New>DocumentLibraryForm</New>
-</FormTemplates>
-</file>
-
 <file path=customXml/item3.xml><?xml version="1.0" encoding="utf-8"?>
-<p:properties xmlns:p="http://schemas.microsoft.com/office/2006/metadata/properties" xmlns:xsi="http://www.w3.org/2001/XMLSchema-instance" xmlns:pc="http://schemas.microsoft.com/office/infopath/2007/PartnerControls">
-  <documentManagement>
-    <_dlc_DocId xmlns="7bb5d761-a2ea-4873-95f7-7a6658fb3ef0">M4CWTKMW727E-592-73</_dlc_DocId>
-    <_dlc_DocIdUrl xmlns="7bb5d761-a2ea-4873-95f7-7a6658fb3ef0">
-      <Url>https://kms.vci.local/marketing/team/_layouts/DocIdRedir.aspx?ID=M4CWTKMW727E-592-73</Url>
-      <Description>M4CWTKMW727E-592-73</Description>
-    </_dlc_DocIdUrl>
-  </documentManagement>
-</p:properties>
-</file>
-
-<file path=customXml/item4.xml><?xml version="1.0" encoding="utf-8"?>
 <ct:contentTypeSchema xmlns:ct="http://schemas.microsoft.com/office/2006/metadata/contentType" xmlns:ma="http://schemas.microsoft.com/office/2006/metadata/properties/metaAttributes" ct:_="" ma:_="" ma:contentTypeName="Document" ma:contentTypeID="0x0101000812F700BE7F874999720E88173FE491" ma:contentTypeVersion="0" ma:contentTypeDescription="Create a new document." ma:contentTypeScope="" ma:versionID="3f79f408e2ca720b7aba6e0e32464d0c">
   <xsd:schema xmlns:xsd="http://www.w3.org/2001/XMLSchema" xmlns:xs="http://www.w3.org/2001/XMLSchema" xmlns:p="http://schemas.microsoft.com/office/2006/metadata/properties" xmlns:ns2="7bb5d761-a2ea-4873-95f7-7a6658fb3ef0" targetNamespace="http://schemas.microsoft.com/office/2006/metadata/properties" ma:root="true" ma:fieldsID="1e062cd38ba31e406bfc4340fbc7f87a" ns2:_="">
     <xsd:import namespace="7bb5d761-a2ea-4873-95f7-7a6658fb3ef0"/>
@@ -16591,7 +16836,27 @@
 </ct:contentTypeSchema>
 </file>
 
+<file path=customXml/item4.xml><?xml version="1.0" encoding="utf-8"?>
+<p:properties xmlns:p="http://schemas.microsoft.com/office/2006/metadata/properties" xmlns:xsi="http://www.w3.org/2001/XMLSchema-instance" xmlns:pc="http://schemas.microsoft.com/office/infopath/2007/PartnerControls">
+  <documentManagement>
+    <_dlc_DocId xmlns="7bb5d761-a2ea-4873-95f7-7a6658fb3ef0">M4CWTKMW727E-592-73</_dlc_DocId>
+    <_dlc_DocIdUrl xmlns="7bb5d761-a2ea-4873-95f7-7a6658fb3ef0">
+      <Url>https://kms.vci.local/marketing/team/_layouts/DocIdRedir.aspx?ID=M4CWTKMW727E-592-73</Url>
+      <Description>M4CWTKMW727E-592-73</Description>
+    </_dlc_DocIdUrl>
+  </documentManagement>
+</p:properties>
+</file>
+
 <file path=customXml/itemProps1.xml><?xml version="1.0" encoding="utf-8"?>
+<ds:datastoreItem xmlns:ds="http://schemas.openxmlformats.org/officeDocument/2006/customXml" ds:itemID="{5CDEB364-43EC-4510-9881-539C2A3FCE9E}">
+  <ds:schemaRefs>
+    <ds:schemaRef ds:uri="http://schemas.microsoft.com/sharepoint/v3/contenttype/forms"/>
+  </ds:schemaRefs>
+</ds:datastoreItem>
+</file>
+
+<file path=customXml/itemProps2.xml><?xml version="1.0" encoding="utf-8"?>
 <ds:datastoreItem xmlns:ds="http://schemas.openxmlformats.org/officeDocument/2006/customXml" ds:itemID="{B13EBC30-FE27-4C6A-B723-23FC2188F7DC}">
   <ds:schemaRefs>
     <ds:schemaRef ds:uri="http://schemas.microsoft.com/sharepoint/events"/>
@@ -16599,31 +16864,7 @@
 </ds:datastoreItem>
 </file>
 
-<file path=customXml/itemProps2.xml><?xml version="1.0" encoding="utf-8"?>
-<ds:datastoreItem xmlns:ds="http://schemas.openxmlformats.org/officeDocument/2006/customXml" ds:itemID="{5CDEB364-43EC-4510-9881-539C2A3FCE9E}">
-  <ds:schemaRefs>
-    <ds:schemaRef ds:uri="http://schemas.microsoft.com/sharepoint/v3/contenttype/forms"/>
-  </ds:schemaRefs>
-</ds:datastoreItem>
-</file>
-
 <file path=customXml/itemProps3.xml><?xml version="1.0" encoding="utf-8"?>
-<ds:datastoreItem xmlns:ds="http://schemas.openxmlformats.org/officeDocument/2006/customXml" ds:itemID="{6921749B-AEB7-461B-845F-603CABD25259}">
-  <ds:schemaRefs>
-    <ds:schemaRef ds:uri="http://schemas.microsoft.com/office/2006/documentManagement/types"/>
-    <ds:schemaRef ds:uri="http://schemas.microsoft.com/office/infopath/2007/PartnerControls"/>
-    <ds:schemaRef ds:uri="http://purl.org/dc/elements/1.1/"/>
-    <ds:schemaRef ds:uri="http://schemas.microsoft.com/office/2006/metadata/properties"/>
-    <ds:schemaRef ds:uri="7bb5d761-a2ea-4873-95f7-7a6658fb3ef0"/>
-    <ds:schemaRef ds:uri="http://purl.org/dc/terms/"/>
-    <ds:schemaRef ds:uri="http://schemas.openxmlformats.org/package/2006/metadata/core-properties"/>
-    <ds:schemaRef ds:uri="http://www.w3.org/XML/1998/namespace"/>
-    <ds:schemaRef ds:uri="http://purl.org/dc/dcmitype/"/>
-  </ds:schemaRefs>
-</ds:datastoreItem>
-</file>
-
-<file path=customXml/itemProps4.xml><?xml version="1.0" encoding="utf-8"?>
 <ds:datastoreItem xmlns:ds="http://schemas.openxmlformats.org/officeDocument/2006/customXml" ds:itemID="{164479E5-0B02-49AC-B79E-EC1D6164DDD3}">
   <ds:schemaRefs>
     <ds:schemaRef ds:uri="http://schemas.microsoft.com/office/2006/metadata/contentType"/>
@@ -16639,4 +16880,20 @@
     <ds:schemaRef ds:uri="http://schemas.microsoft.com/internal/obd"/>
   </ds:schemaRefs>
 </ds:datastoreItem>
+</file>
+
+<file path=customXml/itemProps4.xml><?xml version="1.0" encoding="utf-8"?>
+<ds:datastoreItem xmlns:ds="http://schemas.openxmlformats.org/officeDocument/2006/customXml" ds:itemID="{6921749B-AEB7-461B-845F-603CABD25259}">
+  <ds:schemaRefs>
+    <ds:schemaRef ds:uri="http://schemas.microsoft.com/office/2006/documentManagement/types"/>
+    <ds:schemaRef ds:uri="http://schemas.microsoft.com/office/infopath/2007/PartnerControls"/>
+    <ds:schemaRef ds:uri="http://purl.org/dc/elements/1.1/"/>
+    <ds:schemaRef ds:uri="http://schemas.microsoft.com/office/2006/metadata/properties"/>
+    <ds:schemaRef ds:uri="7bb5d761-a2ea-4873-95f7-7a6658fb3ef0"/>
+    <ds:schemaRef ds:uri="http://purl.org/dc/terms/"/>
+    <ds:schemaRef ds:uri="http://schemas.openxmlformats.org/package/2006/metadata/core-properties"/>
+    <ds:schemaRef ds:uri="http://www.w3.org/XML/1998/namespace"/>
+    <ds:schemaRef ds:uri="http://purl.org/dc/dcmitype/"/>
+  </ds:schemaRefs>
+</ds:datastoreItem>
 </file>
</xml_diff>

<commit_message>
Added intial quiz questions
</commit_message>
<xml_diff>
--- a/07-scheduling-scans-reports.pptx
+++ b/07-scheduling-scans-reports.pptx
@@ -35,7 +35,7 @@
     <p:sldId id="338" r:id="rId27"/>
     <p:sldId id="339" r:id="rId28"/>
     <p:sldId id="340" r:id="rId29"/>
-    <p:sldId id="341" r:id="rId30"/>
+    <p:sldId id="342" r:id="rId30"/>
     <p:sldId id="276" r:id="rId31"/>
     <p:sldId id="267" r:id="rId32"/>
   </p:sldIdLst>
@@ -299,7 +299,7 @@
               <a:pPr>
                 <a:defRPr/>
               </a:pPr>
-              <a:t>2016-02-10</a:t>
+              <a:t>2016-02-12</a:t>
             </a:fld>
             <a:endParaRPr lang="en-US" dirty="0"/>
           </a:p>
@@ -482,7 +482,7 @@
               <a:pPr>
                 <a:defRPr/>
               </a:pPr>
-              <a:t>2016-02-10</a:t>
+              <a:t>2016-02-12</a:t>
             </a:fld>
             <a:endParaRPr lang="en-US" dirty="0"/>
           </a:p>
@@ -1061,7 +1061,72 @@
           <a:bodyPr/>
           <a:lstStyle/>
           <a:p>
-            <a:endParaRPr lang="en-US" dirty="0"/>
+            <a:r>
+              <a:rPr lang="en-US" dirty="0" smtClean="0"/>
+              <a:t>The image on the left shows the user setting the next scheduled scan for 1:45 P.M.</a:t>
+            </a:r>
+            <a:r>
+              <a:rPr lang="en-US" baseline="0" dirty="0" smtClean="0"/>
+              <a:t> local browser time.</a:t>
+            </a:r>
+          </a:p>
+          <a:p>
+            <a:endParaRPr lang="en-US" baseline="0" dirty="0" smtClean="0"/>
+          </a:p>
+          <a:p>
+            <a:pPr marL="0" marR="0" indent="0" algn="l" defTabSz="1217613" rtl="0" eaLnBrk="1" fontAlgn="base" latinLnBrk="0" hangingPunct="1">
+              <a:lnSpc>
+                <a:spcPct val="90000"/>
+              </a:lnSpc>
+              <a:spcBef>
+                <a:spcPct val="30000"/>
+              </a:spcBef>
+              <a:spcAft>
+                <a:spcPts val="450"/>
+              </a:spcAft>
+              <a:buClrTx/>
+              <a:buSzTx/>
+              <a:buFontTx/>
+              <a:buNone/>
+              <a:tabLst/>
+              <a:defRPr/>
+            </a:pPr>
+            <a:r>
+              <a:rPr lang="en-US" baseline="0" dirty="0" smtClean="0"/>
+              <a:t>The image on the right shows the output of `</a:t>
+            </a:r>
+            <a:r>
+              <a:rPr lang="en-US" dirty="0" smtClean="0"/>
+              <a:t>sudo tail -f /var/log/chef-compliance/core/current`</a:t>
+            </a:r>
+            <a:r>
+              <a:rPr lang="en-US" baseline="0" dirty="0"/>
+              <a:t> </a:t>
+            </a:r>
+            <a:r>
+              <a:rPr lang="en-US" baseline="0" dirty="0" smtClean="0"/>
+              <a:t>taken at the very same time that the scan was scheduled. Notice the log file timestamps are in UTC and the next schedule scan is set for </a:t>
+            </a:r>
+            <a:br>
+              <a:rPr lang="en-US" baseline="0" dirty="0" smtClean="0"/>
+            </a:br>
+            <a:r>
+              <a:rPr lang="en-US" baseline="0" dirty="0" smtClean="0"/>
+              <a:t>UTC: </a:t>
+            </a:r>
+            <a:r>
+              <a:rPr lang="en-US" sz="1200" b="1" dirty="0" smtClean="0"/>
+              <a:t>2016-01-12 21:45:00 </a:t>
+            </a:r>
+            <a:r>
+              <a:rPr lang="en-US" sz="1200" dirty="0" smtClean="0"/>
+              <a:t>+0000 UTC instead</a:t>
+            </a:r>
+            <a:r>
+              <a:rPr lang="en-US" sz="1200" baseline="0" dirty="0" smtClean="0"/>
+              <a:t> of the local browser time.</a:t>
+            </a:r>
+            <a:endParaRPr lang="en-US" dirty="0" smtClean="0"/>
           </a:p>
         </p:txBody>
       </p:sp>
@@ -1088,7 +1153,7 @@
               <a:pPr>
                 <a:defRPr/>
               </a:pPr>
-              <a:t>17</a:t>
+              <a:t>16</a:t>
             </a:fld>
             <a:endParaRPr lang="en-US" dirty="0"/>
           </a:p>
@@ -1141,7 +1206,7 @@
     </p:spTree>
     <p:extLst>
       <p:ext uri="{BB962C8B-B14F-4D97-AF65-F5344CB8AC3E}">
-        <p14:creationId xmlns:p14="http://schemas.microsoft.com/office/powerpoint/2010/main" val="156069988"/>
+        <p14:creationId xmlns:p14="http://schemas.microsoft.com/office/powerpoint/2010/main" val="1606503175"/>
       </p:ext>
     </p:extLst>
   </p:cSld>
@@ -1195,18 +1260,6 @@
           <a:bodyPr/>
           <a:lstStyle/>
           <a:p>
-            <a:r>
-              <a:rPr lang="en-US" dirty="0" smtClean="0"/>
-              <a:t>TBD explain </a:t>
-            </a:r>
-            <a:r>
-              <a:rPr lang="en-US" dirty="0" err="1" smtClean="0"/>
-              <a:t>json</a:t>
-            </a:r>
-            <a:r>
-              <a:rPr lang="en-US" dirty="0" smtClean="0"/>
-              <a:t> exporting?</a:t>
-            </a:r>
             <a:endParaRPr lang="en-US" dirty="0"/>
           </a:p>
         </p:txBody>
@@ -1234,7 +1287,7 @@
               <a:pPr>
                 <a:defRPr/>
               </a:pPr>
-              <a:t>19</a:t>
+              <a:t>17</a:t>
             </a:fld>
             <a:endParaRPr lang="en-US" dirty="0"/>
           </a:p>
@@ -1287,7 +1340,7 @@
     </p:spTree>
     <p:extLst>
       <p:ext uri="{BB962C8B-B14F-4D97-AF65-F5344CB8AC3E}">
-        <p14:creationId xmlns:p14="http://schemas.microsoft.com/office/powerpoint/2010/main" val="950970001"/>
+        <p14:creationId xmlns:p14="http://schemas.microsoft.com/office/powerpoint/2010/main" val="156069988"/>
       </p:ext>
     </p:extLst>
   </p:cSld>
@@ -1343,11 +1396,15 @@
           <a:p>
             <a:r>
               <a:rPr lang="en-US" dirty="0" smtClean="0"/>
-              <a:t>Instructor Note: This section is more of a placeholder for exporting Compliance reports after the email and Excel</a:t>
-            </a:r>
-            <a:r>
-              <a:rPr lang="en-US" baseline="0" dirty="0" smtClean="0"/>
-              <a:t> methods are ready for release.</a:t>
+              <a:t>TBD explain </a:t>
+            </a:r>
+            <a:r>
+              <a:rPr lang="en-US" dirty="0" err="1" smtClean="0"/>
+              <a:t>json</a:t>
+            </a:r>
+            <a:r>
+              <a:rPr lang="en-US" dirty="0" smtClean="0"/>
+              <a:t> exporting?</a:t>
             </a:r>
             <a:endParaRPr lang="en-US" dirty="0"/>
           </a:p>
@@ -1376,7 +1433,7 @@
               <a:pPr>
                 <a:defRPr/>
               </a:pPr>
-              <a:t>20</a:t>
+              <a:t>19</a:t>
             </a:fld>
             <a:endParaRPr lang="en-US" dirty="0"/>
           </a:p>
@@ -1429,7 +1486,7 @@
     </p:spTree>
     <p:extLst>
       <p:ext uri="{BB962C8B-B14F-4D97-AF65-F5344CB8AC3E}">
-        <p14:creationId xmlns:p14="http://schemas.microsoft.com/office/powerpoint/2010/main" val="1269756380"/>
+        <p14:creationId xmlns:p14="http://schemas.microsoft.com/office/powerpoint/2010/main" val="950970001"/>
       </p:ext>
     </p:extLst>
   </p:cSld>
@@ -1485,6 +1542,148 @@
           <a:p>
             <a:r>
               <a:rPr lang="en-US" dirty="0" smtClean="0"/>
+              <a:t>Instructor Note: This section is more of a placeholder for exporting Compliance reports after the email and Excel</a:t>
+            </a:r>
+            <a:r>
+              <a:rPr lang="en-US" baseline="0" dirty="0" smtClean="0"/>
+              <a:t> methods are ready for release.</a:t>
+            </a:r>
+            <a:endParaRPr lang="en-US" dirty="0"/>
+          </a:p>
+        </p:txBody>
+      </p:sp>
+      <p:sp>
+        <p:nvSpPr>
+          <p:cNvPr id="4" name="Slide Number Placeholder 3"/>
+          <p:cNvSpPr>
+            <a:spLocks noGrp="1"/>
+          </p:cNvSpPr>
+          <p:nvPr>
+            <p:ph type="sldNum" sz="quarter" idx="10"/>
+          </p:nvPr>
+        </p:nvSpPr>
+        <p:spPr/>
+        <p:txBody>
+          <a:bodyPr/>
+          <a:lstStyle/>
+          <a:p>
+            <a:pPr>
+              <a:defRPr/>
+            </a:pPr>
+            <a:fld id="{DC3734AA-3150-D947-AC52-2F5DF48BFCD5}" type="slidenum">
+              <a:rPr lang="en-US" smtClean="0"/>
+              <a:pPr>
+                <a:defRPr/>
+              </a:pPr>
+              <a:t>20</a:t>
+            </a:fld>
+            <a:endParaRPr lang="en-US" dirty="0"/>
+          </a:p>
+        </p:txBody>
+      </p:sp>
+      <p:sp>
+        <p:nvSpPr>
+          <p:cNvPr id="5" name="Header Placeholder 4"/>
+          <p:cNvSpPr>
+            <a:spLocks noGrp="1"/>
+          </p:cNvSpPr>
+          <p:nvPr>
+            <p:ph type="hdr" sz="quarter" idx="11"/>
+          </p:nvPr>
+        </p:nvSpPr>
+        <p:spPr/>
+        <p:txBody>
+          <a:bodyPr/>
+          <a:lstStyle/>
+          <a:p>
+            <a:pPr>
+              <a:defRPr/>
+            </a:pPr>
+            <a:endParaRPr lang="en-US"/>
+          </a:p>
+        </p:txBody>
+      </p:sp>
+      <p:sp>
+        <p:nvSpPr>
+          <p:cNvPr id="6" name="Footer Placeholder 5"/>
+          <p:cNvSpPr>
+            <a:spLocks noGrp="1"/>
+          </p:cNvSpPr>
+          <p:nvPr>
+            <p:ph type="ftr" sz="quarter" idx="12"/>
+          </p:nvPr>
+        </p:nvSpPr>
+        <p:spPr/>
+        <p:txBody>
+          <a:bodyPr/>
+          <a:lstStyle/>
+          <a:p>
+            <a:pPr>
+              <a:defRPr/>
+            </a:pPr>
+            <a:endParaRPr lang="en-US"/>
+          </a:p>
+        </p:txBody>
+      </p:sp>
+    </p:spTree>
+    <p:extLst>
+      <p:ext uri="{BB962C8B-B14F-4D97-AF65-F5344CB8AC3E}">
+        <p14:creationId xmlns:p14="http://schemas.microsoft.com/office/powerpoint/2010/main" val="1269756380"/>
+      </p:ext>
+    </p:extLst>
+  </p:cSld>
+  <p:clrMapOvr>
+    <a:masterClrMapping/>
+  </p:clrMapOvr>
+</p:notes>
+</file>
+
+<file path=ppt/notesSlides/notesSlide14.xml><?xml version="1.0" encoding="utf-8"?>
+<p:notes xmlns:a="http://schemas.openxmlformats.org/drawingml/2006/main" xmlns:r="http://schemas.openxmlformats.org/officeDocument/2006/relationships" xmlns:p="http://schemas.openxmlformats.org/presentationml/2006/main">
+  <p:cSld>
+    <p:spTree>
+      <p:nvGrpSpPr>
+        <p:cNvPr id="1" name=""/>
+        <p:cNvGrpSpPr/>
+        <p:nvPr/>
+      </p:nvGrpSpPr>
+      <p:grpSpPr>
+        <a:xfrm>
+          <a:off x="0" y="0"/>
+          <a:ext cx="0" cy="0"/>
+          <a:chOff x="0" y="0"/>
+          <a:chExt cx="0" cy="0"/>
+        </a:xfrm>
+      </p:grpSpPr>
+      <p:sp>
+        <p:nvSpPr>
+          <p:cNvPr id="2" name="Slide Image Placeholder 1"/>
+          <p:cNvSpPr>
+            <a:spLocks noGrp="1" noRot="1" noChangeAspect="1"/>
+          </p:cNvSpPr>
+          <p:nvPr>
+            <p:ph type="sldImg"/>
+          </p:nvPr>
+        </p:nvSpPr>
+        <p:spPr/>
+      </p:sp>
+      <p:sp>
+        <p:nvSpPr>
+          <p:cNvPr id="3" name="Notes Placeholder 2"/>
+          <p:cNvSpPr>
+            <a:spLocks noGrp="1"/>
+          </p:cNvSpPr>
+          <p:nvPr>
+            <p:ph type="body" idx="1"/>
+          </p:nvPr>
+        </p:nvSpPr>
+        <p:spPr/>
+        <p:txBody>
+          <a:bodyPr/>
+          <a:lstStyle/>
+          <a:p>
+            <a:r>
+              <a:rPr lang="en-US" dirty="0" smtClean="0"/>
               <a:t>This example is from a Windows user. The</a:t>
             </a:r>
             <a:r>
@@ -1572,6 +1771,570 @@
     <p:extLst>
       <p:ext uri="{BB962C8B-B14F-4D97-AF65-F5344CB8AC3E}">
         <p14:creationId xmlns:p14="http://schemas.microsoft.com/office/powerpoint/2010/main" val="3370402405"/>
+      </p:ext>
+    </p:extLst>
+  </p:cSld>
+  <p:clrMapOvr>
+    <a:masterClrMapping/>
+  </p:clrMapOvr>
+</p:notes>
+</file>
+
+<file path=ppt/notesSlides/notesSlide15.xml><?xml version="1.0" encoding="utf-8"?>
+<p:notes xmlns:a="http://schemas.openxmlformats.org/drawingml/2006/main" xmlns:r="http://schemas.openxmlformats.org/officeDocument/2006/relationships" xmlns:p="http://schemas.openxmlformats.org/presentationml/2006/main">
+  <p:cSld>
+    <p:spTree>
+      <p:nvGrpSpPr>
+        <p:cNvPr id="1" name=""/>
+        <p:cNvGrpSpPr/>
+        <p:nvPr/>
+      </p:nvGrpSpPr>
+      <p:grpSpPr>
+        <a:xfrm>
+          <a:off x="0" y="0"/>
+          <a:ext cx="0" cy="0"/>
+          <a:chOff x="0" y="0"/>
+          <a:chExt cx="0" cy="0"/>
+        </a:xfrm>
+      </p:grpSpPr>
+      <p:sp>
+        <p:nvSpPr>
+          <p:cNvPr id="2" name="Slide Image Placeholder 1"/>
+          <p:cNvSpPr>
+            <a:spLocks noGrp="1" noRot="1" noChangeAspect="1"/>
+          </p:cNvSpPr>
+          <p:nvPr>
+            <p:ph type="sldImg"/>
+          </p:nvPr>
+        </p:nvSpPr>
+        <p:spPr/>
+      </p:sp>
+      <p:sp>
+        <p:nvSpPr>
+          <p:cNvPr id="3" name="Notes Placeholder 2"/>
+          <p:cNvSpPr>
+            <a:spLocks noGrp="1"/>
+          </p:cNvSpPr>
+          <p:nvPr>
+            <p:ph type="body" idx="1"/>
+          </p:nvPr>
+        </p:nvSpPr>
+        <p:spPr/>
+        <p:txBody>
+          <a:bodyPr/>
+          <a:lstStyle/>
+          <a:p>
+            <a:r>
+              <a:rPr lang="en-US" dirty="0" smtClean="0"/>
+              <a:t>Additional methods for exporting reports will be available in the near future.</a:t>
+            </a:r>
+            <a:endParaRPr lang="en-US" dirty="0"/>
+          </a:p>
+        </p:txBody>
+      </p:sp>
+      <p:sp>
+        <p:nvSpPr>
+          <p:cNvPr id="4" name="Slide Number Placeholder 3"/>
+          <p:cNvSpPr>
+            <a:spLocks noGrp="1"/>
+          </p:cNvSpPr>
+          <p:nvPr>
+            <p:ph type="sldNum" sz="quarter" idx="10"/>
+          </p:nvPr>
+        </p:nvSpPr>
+        <p:spPr/>
+        <p:txBody>
+          <a:bodyPr/>
+          <a:lstStyle/>
+          <a:p>
+            <a:pPr>
+              <a:defRPr/>
+            </a:pPr>
+            <a:fld id="{DC3734AA-3150-D947-AC52-2F5DF48BFCD5}" type="slidenum">
+              <a:rPr lang="en-US" smtClean="0"/>
+              <a:pPr>
+                <a:defRPr/>
+              </a:pPr>
+              <a:t>23</a:t>
+            </a:fld>
+            <a:endParaRPr lang="en-US" dirty="0"/>
+          </a:p>
+        </p:txBody>
+      </p:sp>
+      <p:sp>
+        <p:nvSpPr>
+          <p:cNvPr id="5" name="Header Placeholder 4"/>
+          <p:cNvSpPr>
+            <a:spLocks noGrp="1"/>
+          </p:cNvSpPr>
+          <p:nvPr>
+            <p:ph type="hdr" sz="quarter" idx="11"/>
+          </p:nvPr>
+        </p:nvSpPr>
+        <p:spPr/>
+        <p:txBody>
+          <a:bodyPr/>
+          <a:lstStyle/>
+          <a:p>
+            <a:pPr>
+              <a:defRPr/>
+            </a:pPr>
+            <a:endParaRPr lang="en-US"/>
+          </a:p>
+        </p:txBody>
+      </p:sp>
+      <p:sp>
+        <p:nvSpPr>
+          <p:cNvPr id="6" name="Footer Placeholder 5"/>
+          <p:cNvSpPr>
+            <a:spLocks noGrp="1"/>
+          </p:cNvSpPr>
+          <p:nvPr>
+            <p:ph type="ftr" sz="quarter" idx="12"/>
+          </p:nvPr>
+        </p:nvSpPr>
+        <p:spPr/>
+        <p:txBody>
+          <a:bodyPr/>
+          <a:lstStyle/>
+          <a:p>
+            <a:pPr>
+              <a:defRPr/>
+            </a:pPr>
+            <a:endParaRPr lang="en-US"/>
+          </a:p>
+        </p:txBody>
+      </p:sp>
+    </p:spTree>
+    <p:extLst>
+      <p:ext uri="{BB962C8B-B14F-4D97-AF65-F5344CB8AC3E}">
+        <p14:creationId xmlns:p14="http://schemas.microsoft.com/office/powerpoint/2010/main" val="2536358558"/>
+      </p:ext>
+    </p:extLst>
+  </p:cSld>
+  <p:clrMapOvr>
+    <a:masterClrMapping/>
+  </p:clrMapOvr>
+</p:notes>
+</file>
+
+<file path=ppt/notesSlides/notesSlide16.xml><?xml version="1.0" encoding="utf-8"?>
+<p:notes xmlns:a="http://schemas.openxmlformats.org/drawingml/2006/main" xmlns:r="http://schemas.openxmlformats.org/officeDocument/2006/relationships" xmlns:p="http://schemas.openxmlformats.org/presentationml/2006/main">
+  <p:cSld>
+    <p:spTree>
+      <p:nvGrpSpPr>
+        <p:cNvPr id="1" name=""/>
+        <p:cNvGrpSpPr/>
+        <p:nvPr/>
+      </p:nvGrpSpPr>
+      <p:grpSpPr>
+        <a:xfrm>
+          <a:off x="0" y="0"/>
+          <a:ext cx="0" cy="0"/>
+          <a:chOff x="0" y="0"/>
+          <a:chExt cx="0" cy="0"/>
+        </a:xfrm>
+      </p:grpSpPr>
+      <p:sp>
+        <p:nvSpPr>
+          <p:cNvPr id="2" name="Slide Image Placeholder 1"/>
+          <p:cNvSpPr>
+            <a:spLocks noGrp="1" noRot="1" noChangeAspect="1"/>
+          </p:cNvSpPr>
+          <p:nvPr>
+            <p:ph type="sldImg"/>
+          </p:nvPr>
+        </p:nvSpPr>
+        <p:spPr/>
+      </p:sp>
+      <p:sp>
+        <p:nvSpPr>
+          <p:cNvPr id="3" name="Notes Placeholder 2"/>
+          <p:cNvSpPr>
+            <a:spLocks noGrp="1"/>
+          </p:cNvSpPr>
+          <p:nvPr>
+            <p:ph type="body" idx="1"/>
+          </p:nvPr>
+        </p:nvSpPr>
+        <p:spPr/>
+        <p:txBody>
+          <a:bodyPr>
+            <a:normAutofit/>
+          </a:bodyPr>
+          <a:lstStyle/>
+          <a:p>
+            <a:pPr marL="0" marR="0" indent="0" algn="l" defTabSz="1217613" rtl="0" eaLnBrk="1" fontAlgn="base" latinLnBrk="0" hangingPunct="1">
+              <a:lnSpc>
+                <a:spcPct val="90000"/>
+              </a:lnSpc>
+              <a:spcBef>
+                <a:spcPct val="30000"/>
+              </a:spcBef>
+              <a:spcAft>
+                <a:spcPts val="450"/>
+              </a:spcAft>
+              <a:buClrTx/>
+              <a:buSzTx/>
+              <a:buFont typeface="Wingdings" charset="2"/>
+              <a:buNone/>
+              <a:tabLst/>
+              <a:defRPr/>
+            </a:pPr>
+            <a:r>
+              <a:rPr lang="en-US" dirty="0" smtClean="0"/>
+              <a:t>Instructor Note Answers:</a:t>
+            </a:r>
+            <a:br>
+              <a:rPr lang="en-US" dirty="0" smtClean="0"/>
+            </a:br>
+            <a:r>
+              <a:rPr lang="en-US" dirty="0" smtClean="0"/>
+              <a:t>1. Your local workstation's browser time zone.</a:t>
+            </a:r>
+          </a:p>
+          <a:p>
+            <a:pPr marL="0" marR="0" indent="0" algn="l" defTabSz="1217613" rtl="0" eaLnBrk="1" fontAlgn="base" latinLnBrk="0" hangingPunct="1">
+              <a:lnSpc>
+                <a:spcPct val="90000"/>
+              </a:lnSpc>
+              <a:spcBef>
+                <a:spcPct val="30000"/>
+              </a:spcBef>
+              <a:spcAft>
+                <a:spcPts val="450"/>
+              </a:spcAft>
+              <a:buClrTx/>
+              <a:buSzTx/>
+              <a:buFont typeface="Wingdings" charset="2"/>
+              <a:buNone/>
+              <a:tabLst/>
+              <a:defRPr/>
+            </a:pPr>
+            <a:r>
+              <a:rPr lang="en-US" dirty="0" smtClean="0"/>
+              <a:t>2. The time zone for "Recurring" scheduling in the Compliance web UI is based on UTC. (Coordinated Universal Time, which equals GMT.)</a:t>
+            </a:r>
+          </a:p>
+          <a:p>
+            <a:pPr marL="0" marR="0" indent="0" algn="l" defTabSz="1217613" rtl="0" eaLnBrk="1" fontAlgn="base" latinLnBrk="0" hangingPunct="1">
+              <a:lnSpc>
+                <a:spcPct val="90000"/>
+              </a:lnSpc>
+              <a:spcBef>
+                <a:spcPct val="30000"/>
+              </a:spcBef>
+              <a:spcAft>
+                <a:spcPts val="450"/>
+              </a:spcAft>
+              <a:buClrTx/>
+              <a:buSzTx/>
+              <a:buFont typeface="Wingdings" charset="2"/>
+              <a:buNone/>
+              <a:tabLst/>
+              <a:defRPr/>
+            </a:pPr>
+            <a:r>
+              <a:rPr lang="en-US" dirty="0" smtClean="0"/>
+              <a:t>3. They</a:t>
+            </a:r>
+            <a:r>
+              <a:rPr lang="en-US" baseline="0" dirty="0" smtClean="0"/>
+              <a:t> are a list of scheduled scans, past or present.</a:t>
+            </a:r>
+            <a:endParaRPr lang="en-US" dirty="0" smtClean="0"/>
+          </a:p>
+          <a:p>
+            <a:pPr marL="0" indent="0">
+              <a:buFont typeface="Wingdings" charset="2"/>
+              <a:buNone/>
+            </a:pPr>
+            <a:endParaRPr lang="en-US" dirty="0" smtClean="0"/>
+          </a:p>
+          <a:p>
+            <a:pPr marL="0" indent="0">
+              <a:buFont typeface="Wingdings" charset="2"/>
+              <a:buNone/>
+            </a:pPr>
+            <a:endParaRPr lang="en-US" dirty="0" smtClean="0"/>
+          </a:p>
+        </p:txBody>
+      </p:sp>
+      <p:sp>
+        <p:nvSpPr>
+          <p:cNvPr id="4" name="Slide Number Placeholder 3"/>
+          <p:cNvSpPr>
+            <a:spLocks noGrp="1"/>
+          </p:cNvSpPr>
+          <p:nvPr>
+            <p:ph type="sldNum" sz="quarter" idx="10"/>
+          </p:nvPr>
+        </p:nvSpPr>
+        <p:spPr/>
+        <p:txBody>
+          <a:bodyPr/>
+          <a:lstStyle/>
+          <a:p>
+            <a:pPr>
+              <a:defRPr/>
+            </a:pPr>
+            <a:fld id="{DC3734AA-3150-D947-AC52-2F5DF48BFCD5}" type="slidenum">
+              <a:rPr lang="en-US" smtClean="0"/>
+              <a:pPr>
+                <a:defRPr/>
+              </a:pPr>
+              <a:t>24</a:t>
+            </a:fld>
+            <a:endParaRPr lang="en-US" dirty="0"/>
+          </a:p>
+        </p:txBody>
+      </p:sp>
+      <p:sp>
+        <p:nvSpPr>
+          <p:cNvPr id="5" name="Header Placeholder 4"/>
+          <p:cNvSpPr>
+            <a:spLocks noGrp="1"/>
+          </p:cNvSpPr>
+          <p:nvPr>
+            <p:ph type="hdr" sz="quarter" idx="11"/>
+          </p:nvPr>
+        </p:nvSpPr>
+        <p:spPr/>
+        <p:txBody>
+          <a:bodyPr/>
+          <a:lstStyle/>
+          <a:p>
+            <a:pPr>
+              <a:defRPr/>
+            </a:pPr>
+            <a:endParaRPr lang="en-US"/>
+          </a:p>
+        </p:txBody>
+      </p:sp>
+      <p:sp>
+        <p:nvSpPr>
+          <p:cNvPr id="6" name="Footer Placeholder 5"/>
+          <p:cNvSpPr>
+            <a:spLocks noGrp="1"/>
+          </p:cNvSpPr>
+          <p:nvPr>
+            <p:ph type="ftr" sz="quarter" idx="12"/>
+          </p:nvPr>
+        </p:nvSpPr>
+        <p:spPr/>
+        <p:txBody>
+          <a:bodyPr/>
+          <a:lstStyle/>
+          <a:p>
+            <a:pPr>
+              <a:defRPr/>
+            </a:pPr>
+            <a:endParaRPr lang="en-US"/>
+          </a:p>
+        </p:txBody>
+      </p:sp>
+    </p:spTree>
+    <p:extLst>
+      <p:ext uri="{BB962C8B-B14F-4D97-AF65-F5344CB8AC3E}">
+        <p14:creationId xmlns:p14="http://schemas.microsoft.com/office/powerpoint/2010/main" val="3706320340"/>
+      </p:ext>
+    </p:extLst>
+  </p:cSld>
+  <p:clrMapOvr>
+    <a:masterClrMapping/>
+  </p:clrMapOvr>
+</p:notes>
+</file>
+
+<file path=ppt/notesSlides/notesSlide17.xml><?xml version="1.0" encoding="utf-8"?>
+<p:notes xmlns:a="http://schemas.openxmlformats.org/drawingml/2006/main" xmlns:r="http://schemas.openxmlformats.org/officeDocument/2006/relationships" xmlns:p="http://schemas.openxmlformats.org/presentationml/2006/main">
+  <p:cSld>
+    <p:spTree>
+      <p:nvGrpSpPr>
+        <p:cNvPr id="1" name=""/>
+        <p:cNvGrpSpPr/>
+        <p:nvPr/>
+      </p:nvGrpSpPr>
+      <p:grpSpPr>
+        <a:xfrm>
+          <a:off x="0" y="0"/>
+          <a:ext cx="0" cy="0"/>
+          <a:chOff x="0" y="0"/>
+          <a:chExt cx="0" cy="0"/>
+        </a:xfrm>
+      </p:grpSpPr>
+      <p:sp>
+        <p:nvSpPr>
+          <p:cNvPr id="2" name="Slide Image Placeholder 1"/>
+          <p:cNvSpPr>
+            <a:spLocks noGrp="1" noRot="1" noChangeAspect="1"/>
+          </p:cNvSpPr>
+          <p:nvPr>
+            <p:ph type="sldImg"/>
+          </p:nvPr>
+        </p:nvSpPr>
+        <p:spPr/>
+      </p:sp>
+      <p:sp>
+        <p:nvSpPr>
+          <p:cNvPr id="3" name="Notes Placeholder 2"/>
+          <p:cNvSpPr>
+            <a:spLocks noGrp="1"/>
+          </p:cNvSpPr>
+          <p:nvPr>
+            <p:ph type="body" idx="1"/>
+          </p:nvPr>
+        </p:nvSpPr>
+        <p:spPr/>
+        <p:txBody>
+          <a:bodyPr>
+            <a:normAutofit/>
+          </a:bodyPr>
+          <a:lstStyle/>
+          <a:p>
+            <a:pPr marL="0" marR="0" indent="0" algn="l" defTabSz="1217613" rtl="0" eaLnBrk="1" fontAlgn="base" latinLnBrk="0" hangingPunct="1">
+              <a:lnSpc>
+                <a:spcPct val="90000"/>
+              </a:lnSpc>
+              <a:spcBef>
+                <a:spcPct val="30000"/>
+              </a:spcBef>
+              <a:spcAft>
+                <a:spcPts val="450"/>
+              </a:spcAft>
+              <a:buClrTx/>
+              <a:buSzTx/>
+              <a:buFont typeface="Wingdings" charset="2"/>
+              <a:buNone/>
+              <a:tabLst/>
+              <a:defRPr/>
+            </a:pPr>
+            <a:r>
+              <a:rPr lang="en-US" dirty="0" smtClean="0"/>
+              <a:t>Instructor Note Answers:</a:t>
+            </a:r>
+            <a:br>
+              <a:rPr lang="en-US" dirty="0" smtClean="0"/>
+            </a:br>
+            <a:r>
+              <a:rPr lang="en-US" dirty="0" smtClean="0"/>
+              <a:t>4.</a:t>
+            </a:r>
+            <a:r>
+              <a:rPr lang="en-US" baseline="0" dirty="0" smtClean="0"/>
+              <a:t> b. On the Reports page.</a:t>
+            </a:r>
+          </a:p>
+          <a:p>
+            <a:pPr marL="0" marR="0" indent="0" algn="l" defTabSz="1217613" rtl="0" eaLnBrk="1" fontAlgn="base" latinLnBrk="0" hangingPunct="1">
+              <a:lnSpc>
+                <a:spcPct val="90000"/>
+              </a:lnSpc>
+              <a:spcBef>
+                <a:spcPct val="30000"/>
+              </a:spcBef>
+              <a:spcAft>
+                <a:spcPts val="450"/>
+              </a:spcAft>
+              <a:buClrTx/>
+              <a:buSzTx/>
+              <a:buFont typeface="Wingdings" charset="2"/>
+              <a:buNone/>
+              <a:tabLst/>
+              <a:defRPr/>
+            </a:pPr>
+            <a:r>
+              <a:rPr lang="en-US" baseline="0" dirty="0" smtClean="0"/>
+              <a:t>5. Print/Save to PDF...(more to come)</a:t>
+            </a:r>
+            <a:endParaRPr lang="en-US" dirty="0" smtClean="0"/>
+          </a:p>
+          <a:p>
+            <a:pPr marL="0" indent="0">
+              <a:buFont typeface="Wingdings" charset="2"/>
+              <a:buNone/>
+            </a:pPr>
+            <a:endParaRPr lang="en-US" dirty="0" smtClean="0"/>
+          </a:p>
+        </p:txBody>
+      </p:sp>
+      <p:sp>
+        <p:nvSpPr>
+          <p:cNvPr id="4" name="Slide Number Placeholder 3"/>
+          <p:cNvSpPr>
+            <a:spLocks noGrp="1"/>
+          </p:cNvSpPr>
+          <p:nvPr>
+            <p:ph type="sldNum" sz="quarter" idx="10"/>
+          </p:nvPr>
+        </p:nvSpPr>
+        <p:spPr/>
+        <p:txBody>
+          <a:bodyPr/>
+          <a:lstStyle/>
+          <a:p>
+            <a:pPr>
+              <a:defRPr/>
+            </a:pPr>
+            <a:fld id="{DC3734AA-3150-D947-AC52-2F5DF48BFCD5}" type="slidenum">
+              <a:rPr lang="en-US" smtClean="0"/>
+              <a:pPr>
+                <a:defRPr/>
+              </a:pPr>
+              <a:t>25</a:t>
+            </a:fld>
+            <a:endParaRPr lang="en-US" dirty="0"/>
+          </a:p>
+        </p:txBody>
+      </p:sp>
+      <p:sp>
+        <p:nvSpPr>
+          <p:cNvPr id="5" name="Header Placeholder 4"/>
+          <p:cNvSpPr>
+            <a:spLocks noGrp="1"/>
+          </p:cNvSpPr>
+          <p:nvPr>
+            <p:ph type="hdr" sz="quarter" idx="11"/>
+          </p:nvPr>
+        </p:nvSpPr>
+        <p:spPr/>
+        <p:txBody>
+          <a:bodyPr/>
+          <a:lstStyle/>
+          <a:p>
+            <a:pPr>
+              <a:defRPr/>
+            </a:pPr>
+            <a:endParaRPr lang="en-US"/>
+          </a:p>
+        </p:txBody>
+      </p:sp>
+      <p:sp>
+        <p:nvSpPr>
+          <p:cNvPr id="6" name="Footer Placeholder 5"/>
+          <p:cNvSpPr>
+            <a:spLocks noGrp="1"/>
+          </p:cNvSpPr>
+          <p:nvPr>
+            <p:ph type="ftr" sz="quarter" idx="12"/>
+          </p:nvPr>
+        </p:nvSpPr>
+        <p:spPr/>
+        <p:txBody>
+          <a:bodyPr/>
+          <a:lstStyle/>
+          <a:p>
+            <a:pPr>
+              <a:defRPr/>
+            </a:pPr>
+            <a:endParaRPr lang="en-US"/>
+          </a:p>
+        </p:txBody>
+      </p:sp>
+    </p:spTree>
+    <p:extLst>
+      <p:ext uri="{BB962C8B-B14F-4D97-AF65-F5344CB8AC3E}">
+        <p14:creationId xmlns:p14="http://schemas.microsoft.com/office/powerpoint/2010/main" val="1615745133"/>
       </p:ext>
     </p:extLst>
   </p:cSld>
@@ -1652,7 +2415,7 @@
               <a:pPr>
                 <a:defRPr/>
               </a:pPr>
-              <a:t>3</a:t>
+              <a:t>2</a:t>
             </a:fld>
             <a:endParaRPr lang="en-US" dirty="0"/>
           </a:p>
@@ -1705,7 +2468,7 @@
     </p:spTree>
     <p:extLst>
       <p:ext uri="{BB962C8B-B14F-4D97-AF65-F5344CB8AC3E}">
-        <p14:creationId xmlns:p14="http://schemas.microsoft.com/office/powerpoint/2010/main" val="2506830153"/>
+        <p14:creationId xmlns:p14="http://schemas.microsoft.com/office/powerpoint/2010/main" val="1899291814"/>
       </p:ext>
     </p:extLst>
   </p:cSld>
@@ -1759,73 +2522,6 @@
           <a:bodyPr/>
           <a:lstStyle/>
           <a:p>
-            <a:r>
-              <a:rPr lang="en-US" dirty="0" smtClean="0"/>
-              <a:t>This time distinction is important</a:t>
-            </a:r>
-            <a:r>
-              <a:rPr lang="en-US" baseline="0" dirty="0" smtClean="0"/>
-              <a:t> when scheduling scans or if viewing the compliance logs.</a:t>
-            </a:r>
-          </a:p>
-          <a:p>
-            <a:endParaRPr lang="en-US" baseline="0" dirty="0" smtClean="0"/>
-          </a:p>
-          <a:p>
-            <a:pPr marL="0" marR="0" indent="0" algn="l" defTabSz="1217613" rtl="0" eaLnBrk="1" fontAlgn="base" latinLnBrk="0" hangingPunct="1">
-              <a:lnSpc>
-                <a:spcPct val="90000"/>
-              </a:lnSpc>
-              <a:spcBef>
-                <a:spcPct val="30000"/>
-              </a:spcBef>
-              <a:spcAft>
-                <a:spcPts val="450"/>
-              </a:spcAft>
-              <a:buClrTx/>
-              <a:buSzTx/>
-              <a:buFontTx/>
-              <a:buNone/>
-              <a:tabLst/>
-              <a:defRPr/>
-            </a:pPr>
-            <a:r>
-              <a:rPr lang="en-US" dirty="0" smtClean="0"/>
-              <a:t>Instructor Note: As</a:t>
-            </a:r>
-            <a:r>
-              <a:rPr lang="en-US" baseline="0" dirty="0" smtClean="0"/>
-              <a:t> of this writing this slide is correct but it could be subject to change. Also, here is the `tail` command in case you want to demonstrate the logs as you set a scheduled scan: `</a:t>
-            </a:r>
-            <a:r>
-              <a:rPr lang="en-US" dirty="0" smtClean="0"/>
-              <a:t>sudo tail -f /var/log/chef-compliance/core/current`/</a:t>
-            </a:r>
-          </a:p>
-          <a:p>
-            <a:pPr marL="0" marR="0" indent="0" algn="l" defTabSz="1217613" rtl="0" eaLnBrk="1" fontAlgn="base" latinLnBrk="0" hangingPunct="1">
-              <a:lnSpc>
-                <a:spcPct val="90000"/>
-              </a:lnSpc>
-              <a:spcBef>
-                <a:spcPct val="30000"/>
-              </a:spcBef>
-              <a:spcAft>
-                <a:spcPts val="450"/>
-              </a:spcAft>
-              <a:buClrTx/>
-              <a:buSzTx/>
-              <a:buFontTx/>
-              <a:buNone/>
-              <a:tabLst/>
-              <a:defRPr/>
-            </a:pPr>
-            <a:endParaRPr lang="en-US" dirty="0" smtClean="0"/>
-          </a:p>
-          <a:p>
-            <a:endParaRPr lang="en-US" dirty="0" smtClean="0"/>
-          </a:p>
-          <a:p>
             <a:endParaRPr lang="en-US" dirty="0"/>
           </a:p>
         </p:txBody>
@@ -1853,7 +2549,7 @@
               <a:pPr>
                 <a:defRPr/>
               </a:pPr>
-              <a:t>4</a:t>
+              <a:t>3</a:t>
             </a:fld>
             <a:endParaRPr lang="en-US" dirty="0"/>
           </a:p>
@@ -1906,7 +2602,7 @@
     </p:spTree>
     <p:extLst>
       <p:ext uri="{BB962C8B-B14F-4D97-AF65-F5344CB8AC3E}">
-        <p14:creationId xmlns:p14="http://schemas.microsoft.com/office/powerpoint/2010/main" val="2214351691"/>
+        <p14:creationId xmlns:p14="http://schemas.microsoft.com/office/powerpoint/2010/main" val="2506830153"/>
       </p:ext>
     </p:extLst>
   </p:cSld>
@@ -1960,6 +2656,73 @@
           <a:bodyPr/>
           <a:lstStyle/>
           <a:p>
+            <a:r>
+              <a:rPr lang="en-US" dirty="0" smtClean="0"/>
+              <a:t>This time distinction is important</a:t>
+            </a:r>
+            <a:r>
+              <a:rPr lang="en-US" baseline="0" dirty="0" smtClean="0"/>
+              <a:t> when scheduling scans or if viewing the compliance logs.</a:t>
+            </a:r>
+          </a:p>
+          <a:p>
+            <a:endParaRPr lang="en-US" baseline="0" dirty="0" smtClean="0"/>
+          </a:p>
+          <a:p>
+            <a:pPr marL="0" marR="0" indent="0" algn="l" defTabSz="1217613" rtl="0" eaLnBrk="1" fontAlgn="base" latinLnBrk="0" hangingPunct="1">
+              <a:lnSpc>
+                <a:spcPct val="90000"/>
+              </a:lnSpc>
+              <a:spcBef>
+                <a:spcPct val="30000"/>
+              </a:spcBef>
+              <a:spcAft>
+                <a:spcPts val="450"/>
+              </a:spcAft>
+              <a:buClrTx/>
+              <a:buSzTx/>
+              <a:buFontTx/>
+              <a:buNone/>
+              <a:tabLst/>
+              <a:defRPr/>
+            </a:pPr>
+            <a:r>
+              <a:rPr lang="en-US" dirty="0" smtClean="0"/>
+              <a:t>Instructor Note: As</a:t>
+            </a:r>
+            <a:r>
+              <a:rPr lang="en-US" baseline="0" dirty="0" smtClean="0"/>
+              <a:t> of this writing this slide is correct but it could be subject to change. Also, here is the `tail` command in case you want to demonstrate the logs as you set a scheduled scan: `</a:t>
+            </a:r>
+            <a:r>
+              <a:rPr lang="en-US" dirty="0" smtClean="0"/>
+              <a:t>sudo tail -f /var/log/chef-compliance/core/current`/</a:t>
+            </a:r>
+          </a:p>
+          <a:p>
+            <a:pPr marL="0" marR="0" indent="0" algn="l" defTabSz="1217613" rtl="0" eaLnBrk="1" fontAlgn="base" latinLnBrk="0" hangingPunct="1">
+              <a:lnSpc>
+                <a:spcPct val="90000"/>
+              </a:lnSpc>
+              <a:spcBef>
+                <a:spcPct val="30000"/>
+              </a:spcBef>
+              <a:spcAft>
+                <a:spcPts val="450"/>
+              </a:spcAft>
+              <a:buClrTx/>
+              <a:buSzTx/>
+              <a:buFontTx/>
+              <a:buNone/>
+              <a:tabLst/>
+              <a:defRPr/>
+            </a:pPr>
+            <a:endParaRPr lang="en-US" dirty="0" smtClean="0"/>
+          </a:p>
+          <a:p>
+            <a:endParaRPr lang="en-US" dirty="0" smtClean="0"/>
+          </a:p>
+          <a:p>
             <a:endParaRPr lang="en-US" dirty="0"/>
           </a:p>
         </p:txBody>
@@ -1987,7 +2750,7 @@
               <a:pPr>
                 <a:defRPr/>
               </a:pPr>
-              <a:t>9</a:t>
+              <a:t>4</a:t>
             </a:fld>
             <a:endParaRPr lang="en-US" dirty="0"/>
           </a:p>
@@ -2040,7 +2803,7 @@
     </p:spTree>
     <p:extLst>
       <p:ext uri="{BB962C8B-B14F-4D97-AF65-F5344CB8AC3E}">
-        <p14:creationId xmlns:p14="http://schemas.microsoft.com/office/powerpoint/2010/main" val="203755913"/>
+        <p14:creationId xmlns:p14="http://schemas.microsoft.com/office/powerpoint/2010/main" val="2214351691"/>
       </p:ext>
     </p:extLst>
   </p:cSld>
@@ -2121,7 +2884,7 @@
               <a:pPr>
                 <a:defRPr/>
               </a:pPr>
-              <a:t>10</a:t>
+              <a:t>9</a:t>
             </a:fld>
             <a:endParaRPr lang="en-US" dirty="0"/>
           </a:p>
@@ -2174,7 +2937,7 @@
     </p:spTree>
     <p:extLst>
       <p:ext uri="{BB962C8B-B14F-4D97-AF65-F5344CB8AC3E}">
-        <p14:creationId xmlns:p14="http://schemas.microsoft.com/office/powerpoint/2010/main" val="3077080090"/>
+        <p14:creationId xmlns:p14="http://schemas.microsoft.com/office/powerpoint/2010/main" val="203755913"/>
       </p:ext>
     </p:extLst>
   </p:cSld>
@@ -2228,10 +2991,6 @@
           <a:bodyPr/>
           <a:lstStyle/>
           <a:p>
-            <a:r>
-              <a:rPr lang="en-US" dirty="0" smtClean="0"/>
-              <a:t>It may take a minute or two after the scan is run for the report to display.</a:t>
-            </a:r>
             <a:endParaRPr lang="en-US" dirty="0"/>
           </a:p>
         </p:txBody>
@@ -2259,7 +3018,7 @@
               <a:pPr>
                 <a:defRPr/>
               </a:pPr>
-              <a:t>11</a:t>
+              <a:t>10</a:t>
             </a:fld>
             <a:endParaRPr lang="en-US" dirty="0"/>
           </a:p>
@@ -2312,7 +3071,7 @@
     </p:spTree>
     <p:extLst>
       <p:ext uri="{BB962C8B-B14F-4D97-AF65-F5344CB8AC3E}">
-        <p14:creationId xmlns:p14="http://schemas.microsoft.com/office/powerpoint/2010/main" val="2974555743"/>
+        <p14:creationId xmlns:p14="http://schemas.microsoft.com/office/powerpoint/2010/main" val="3077080090"/>
       </p:ext>
     </p:extLst>
   </p:cSld>
@@ -2366,6 +3125,10 @@
           <a:bodyPr/>
           <a:lstStyle/>
           <a:p>
+            <a:r>
+              <a:rPr lang="en-US" dirty="0" smtClean="0"/>
+              <a:t>It may take a minute or two after the scan is run for the report to display.</a:t>
+            </a:r>
             <a:endParaRPr lang="en-US" dirty="0"/>
           </a:p>
         </p:txBody>
@@ -2393,7 +3156,7 @@
               <a:pPr>
                 <a:defRPr/>
               </a:pPr>
-              <a:t>14</a:t>
+              <a:t>11</a:t>
             </a:fld>
             <a:endParaRPr lang="en-US" dirty="0"/>
           </a:p>
@@ -2446,7 +3209,7 @@
     </p:spTree>
     <p:extLst>
       <p:ext uri="{BB962C8B-B14F-4D97-AF65-F5344CB8AC3E}">
-        <p14:creationId xmlns:p14="http://schemas.microsoft.com/office/powerpoint/2010/main" val="1630792651"/>
+        <p14:creationId xmlns:p14="http://schemas.microsoft.com/office/powerpoint/2010/main" val="2974555743"/>
       </p:ext>
     </p:extLst>
   </p:cSld>
@@ -2500,89 +3263,6 @@
           <a:bodyPr/>
           <a:lstStyle/>
           <a:p>
-            <a:pPr marL="0" marR="0" indent="0" algn="l" defTabSz="1217613" rtl="0" eaLnBrk="1" fontAlgn="base" latinLnBrk="0" hangingPunct="1">
-              <a:lnSpc>
-                <a:spcPct val="90000"/>
-              </a:lnSpc>
-              <a:spcBef>
-                <a:spcPct val="30000"/>
-              </a:spcBef>
-              <a:spcAft>
-                <a:spcPts val="450"/>
-              </a:spcAft>
-              <a:buClrTx/>
-              <a:buSzTx/>
-              <a:buFontTx/>
-              <a:buNone/>
-              <a:tabLst/>
-              <a:defRPr/>
-            </a:pPr>
-            <a:r>
-              <a:rPr lang="en-US" dirty="0" smtClean="0"/>
-              <a:t>Instructor Note: As this slide indicates, tailing the log files is not required but can be of interest to some users. In one scenario where it came in handy, a browser session to the Compliance Server</a:t>
-            </a:r>
-            <a:r>
-              <a:rPr lang="en-US" baseline="0" dirty="0" smtClean="0"/>
-              <a:t> got stale and would not schedule a scan. After tailing the log files and realizing the scan was not even being scheduled, the user refreshed the </a:t>
-            </a:r>
-            <a:r>
-              <a:rPr lang="en-US" dirty="0" smtClean="0"/>
-              <a:t>Compliance Server web UI</a:t>
-            </a:r>
-            <a:r>
-              <a:rPr lang="en-US" baseline="0" dirty="0" smtClean="0"/>
-              <a:t>, logged in again, and the scan would properly schedule and run.</a:t>
-            </a:r>
-          </a:p>
-          <a:p>
-            <a:pPr marL="0" marR="0" indent="0" algn="l" defTabSz="1217613" rtl="0" eaLnBrk="1" fontAlgn="base" latinLnBrk="0" hangingPunct="1">
-              <a:lnSpc>
-                <a:spcPct val="90000"/>
-              </a:lnSpc>
-              <a:spcBef>
-                <a:spcPct val="30000"/>
-              </a:spcBef>
-              <a:spcAft>
-                <a:spcPts val="450"/>
-              </a:spcAft>
-              <a:buClrTx/>
-              <a:buSzTx/>
-              <a:buFontTx/>
-              <a:buNone/>
-              <a:tabLst/>
-              <a:defRPr/>
-            </a:pPr>
-            <a:endParaRPr lang="en-US" baseline="0" dirty="0" smtClean="0"/>
-          </a:p>
-          <a:p>
-            <a:pPr marL="0" marR="0" indent="0" algn="l" defTabSz="1217613" rtl="0" eaLnBrk="1" fontAlgn="base" latinLnBrk="0" hangingPunct="1">
-              <a:lnSpc>
-                <a:spcPct val="90000"/>
-              </a:lnSpc>
-              <a:spcBef>
-                <a:spcPct val="30000"/>
-              </a:spcBef>
-              <a:spcAft>
-                <a:spcPts val="450"/>
-              </a:spcAft>
-              <a:buClrTx/>
-              <a:buSzTx/>
-              <a:buFontTx/>
-              <a:buNone/>
-              <a:tabLst/>
-              <a:defRPr/>
-            </a:pPr>
-            <a:r>
-              <a:rPr lang="en-US" dirty="0" smtClean="0"/>
-              <a:t>Instructor Note: If you find yourself ahead of schedule, you can spend some</a:t>
-            </a:r>
-            <a:r>
-              <a:rPr lang="en-US" baseline="0" dirty="0" smtClean="0"/>
-              <a:t> time demonstration the output of this log file as you perform a number of procedures via the Web UI.</a:t>
-            </a:r>
-            <a:endParaRPr lang="en-US" dirty="0" smtClean="0"/>
-          </a:p>
-          <a:p>
             <a:endParaRPr lang="en-US" dirty="0"/>
           </a:p>
         </p:txBody>
@@ -2610,7 +3290,7 @@
               <a:pPr>
                 <a:defRPr/>
               </a:pPr>
-              <a:t>15</a:t>
+              <a:t>14</a:t>
             </a:fld>
             <a:endParaRPr lang="en-US" dirty="0"/>
           </a:p>
@@ -2663,7 +3343,7 @@
     </p:spTree>
     <p:extLst>
       <p:ext uri="{BB962C8B-B14F-4D97-AF65-F5344CB8AC3E}">
-        <p14:creationId xmlns:p14="http://schemas.microsoft.com/office/powerpoint/2010/main" val="2421445266"/>
+        <p14:creationId xmlns:p14="http://schemas.microsoft.com/office/powerpoint/2010/main" val="1630792651"/>
       </p:ext>
     </p:extLst>
   </p:cSld>
@@ -2717,19 +3397,6 @@
           <a:bodyPr/>
           <a:lstStyle/>
           <a:p>
-            <a:r>
-              <a:rPr lang="en-US" dirty="0" smtClean="0"/>
-              <a:t>The image on the left shows the user setting the next scheduled scan for 1:45 P.M.</a:t>
-            </a:r>
-            <a:r>
-              <a:rPr lang="en-US" baseline="0" dirty="0" smtClean="0"/>
-              <a:t> local browser time.</a:t>
-            </a:r>
-          </a:p>
-          <a:p>
-            <a:endParaRPr lang="en-US" baseline="0" dirty="0" smtClean="0"/>
-          </a:p>
-          <a:p>
             <a:pPr marL="0" marR="0" indent="0" algn="l" defTabSz="1217613" rtl="0" eaLnBrk="1" fontAlgn="base" latinLnBrk="0" hangingPunct="1">
               <a:lnSpc>
                 <a:spcPct val="90000"/>
@@ -2748,41 +3415,72 @@
               <a:defRPr/>
             </a:pPr>
             <a:r>
+              <a:rPr lang="en-US" dirty="0" smtClean="0"/>
+              <a:t>Instructor Note: As this slide indicates, tailing the log files is not required but can be of interest to some users. In one scenario where it came in handy, a browser session to the Compliance Server</a:t>
+            </a:r>
+            <a:r>
               <a:rPr lang="en-US" baseline="0" dirty="0" smtClean="0"/>
-              <a:t>The image on the right shows the output of `</a:t>
-            </a:r>
-            <a:r>
-              <a:rPr lang="en-US" dirty="0" smtClean="0"/>
-              <a:t>sudo tail -f /var/log/chef-compliance/core/current`</a:t>
-            </a:r>
-            <a:r>
-              <a:rPr lang="en-US" baseline="0" dirty="0"/>
-              <a:t> </a:t>
+              <a:t> got stale and would not schedule a scan. After tailing the log files and realizing the scan was not even being scheduled, the user refreshed the </a:t>
+            </a:r>
+            <a:r>
+              <a:rPr lang="en-US" dirty="0" smtClean="0"/>
+              <a:t>Compliance Server web UI</a:t>
             </a:r>
             <a:r>
               <a:rPr lang="en-US" baseline="0" dirty="0" smtClean="0"/>
-              <a:t>taken at the very same time that the scan was scheduled. Notice the log file timestamps are in UTC and the next schedule scan is set for </a:t>
-            </a:r>
-            <a:br>
+              <a:t>, logged in again, and the scan would properly schedule and run.</a:t>
+            </a:r>
+          </a:p>
+          <a:p>
+            <a:pPr marL="0" marR="0" indent="0" algn="l" defTabSz="1217613" rtl="0" eaLnBrk="1" fontAlgn="base" latinLnBrk="0" hangingPunct="1">
+              <a:lnSpc>
+                <a:spcPct val="90000"/>
+              </a:lnSpc>
+              <a:spcBef>
+                <a:spcPct val="30000"/>
+              </a:spcBef>
+              <a:spcAft>
+                <a:spcPts val="450"/>
+              </a:spcAft>
+              <a:buClrTx/>
+              <a:buSzTx/>
+              <a:buFontTx/>
+              <a:buNone/>
+              <a:tabLst/>
+              <a:defRPr/>
+            </a:pPr>
+            <a:endParaRPr lang="en-US" baseline="0" dirty="0" smtClean="0"/>
+          </a:p>
+          <a:p>
+            <a:pPr marL="0" marR="0" indent="0" algn="l" defTabSz="1217613" rtl="0" eaLnBrk="1" fontAlgn="base" latinLnBrk="0" hangingPunct="1">
+              <a:lnSpc>
+                <a:spcPct val="90000"/>
+              </a:lnSpc>
+              <a:spcBef>
+                <a:spcPct val="30000"/>
+              </a:spcBef>
+              <a:spcAft>
+                <a:spcPts val="450"/>
+              </a:spcAft>
+              <a:buClrTx/>
+              <a:buSzTx/>
+              <a:buFontTx/>
+              <a:buNone/>
+              <a:tabLst/>
+              <a:defRPr/>
+            </a:pPr>
+            <a:r>
+              <a:rPr lang="en-US" dirty="0" smtClean="0"/>
+              <a:t>Instructor Note: If you find yourself ahead of schedule, you can spend some</a:t>
+            </a:r>
+            <a:r>
               <a:rPr lang="en-US" baseline="0" dirty="0" smtClean="0"/>
-            </a:br>
-            <a:r>
-              <a:rPr lang="en-US" baseline="0" dirty="0" smtClean="0"/>
-              <a:t>UTC: </a:t>
-            </a:r>
-            <a:r>
-              <a:rPr lang="en-US" sz="1200" b="1" dirty="0" smtClean="0"/>
-              <a:t>2016-01-12 21:45:00 </a:t>
-            </a:r>
-            <a:r>
-              <a:rPr lang="en-US" sz="1200" dirty="0" smtClean="0"/>
-              <a:t>+0000 UTC instead</a:t>
-            </a:r>
-            <a:r>
-              <a:rPr lang="en-US" sz="1200" baseline="0" dirty="0" smtClean="0"/>
-              <a:t> of the local browser time.</a:t>
+              <a:t> time demonstration the output of this log file as you perform a number of procedures via the Web UI.</a:t>
             </a:r>
             <a:endParaRPr lang="en-US" dirty="0" smtClean="0"/>
+          </a:p>
+          <a:p>
+            <a:endParaRPr lang="en-US" dirty="0"/>
           </a:p>
         </p:txBody>
       </p:sp>
@@ -2809,7 +3507,7 @@
               <a:pPr>
                 <a:defRPr/>
               </a:pPr>
-              <a:t>16</a:t>
+              <a:t>15</a:t>
             </a:fld>
             <a:endParaRPr lang="en-US" dirty="0"/>
           </a:p>
@@ -2862,7 +3560,7 @@
     </p:spTree>
     <p:extLst>
       <p:ext uri="{BB962C8B-B14F-4D97-AF65-F5344CB8AC3E}">
-        <p14:creationId xmlns:p14="http://schemas.microsoft.com/office/powerpoint/2010/main" val="1606503175"/>
+        <p14:creationId xmlns:p14="http://schemas.microsoft.com/office/powerpoint/2010/main" val="2421445266"/>
       </p:ext>
     </p:extLst>
   </p:cSld>
@@ -11194,13 +11892,8 @@
           <a:p>
             <a:r>
               <a:rPr lang="en-US" dirty="0" smtClean="0"/>
-              <a:t>When 5 minutes have elapsed, refresh your browser and you should see that your Job's status is now "done</a:t>
-            </a:r>
-            <a:r>
-              <a:rPr lang="en-US" dirty="0" smtClean="0"/>
-              <a:t>".</a:t>
-            </a:r>
-            <a:endParaRPr lang="en-US" dirty="0" smtClean="0"/>
+              <a:t>When 5 minutes have elapsed, refresh your browser and you should see that your Job's status is now "done".</a:t>
+            </a:r>
           </a:p>
           <a:p>
             <a:endParaRPr lang="en-US" dirty="0"/>
@@ -12364,6 +13057,13 @@
   <p:transition spd="med">
     <p:fade/>
   </p:transition>
+  <p:timing>
+    <p:tnLst>
+      <p:par>
+        <p:cTn id="1" dur="indefinite" restart="never" nodeType="tmRoot"/>
+      </p:par>
+    </p:tnLst>
+  </p:timing>
 </p:sld>
 </file>
 
@@ -12621,6 +13321,13 @@
   <p:transition spd="med">
     <p:fade/>
   </p:transition>
+  <p:timing>
+    <p:tnLst>
+      <p:par>
+        <p:cTn id="1" dur="indefinite" restart="never" nodeType="tmRoot"/>
+      </p:par>
+    </p:tnLst>
+  </p:timing>
 </p:sld>
 </file>
 
@@ -13173,6 +13880,13 @@
   <p:transition spd="med">
     <p:fade/>
   </p:transition>
+  <p:timing>
+    <p:tnLst>
+      <p:par>
+        <p:cTn id="1" dur="indefinite" restart="never" nodeType="tmRoot"/>
+      </p:par>
+    </p:tnLst>
+  </p:timing>
 </p:sld>
 </file>
 
@@ -13426,6 +14140,13 @@
   <p:transition spd="med">
     <p:fade/>
   </p:transition>
+  <p:timing>
+    <p:tnLst>
+      <p:par>
+        <p:cTn id="1" dur="indefinite" restart="never" nodeType="tmRoot"/>
+      </p:par>
+    </p:tnLst>
+  </p:timing>
 </p:sld>
 </file>
 
@@ -13508,7 +14229,7 @@
           <p:nvPr/>
         </p:nvPicPr>
         <p:blipFill>
-          <a:blip r:embed="rId2"/>
+          <a:blip r:embed="rId3"/>
           <a:stretch>
             <a:fillRect/>
           </a:stretch>
@@ -13578,19 +14299,14 @@
             <p:ph type="title"/>
           </p:nvPr>
         </p:nvSpPr>
-        <p:spPr>
-          <a:xfrm>
-            <a:off x="590405" y="371708"/>
-            <a:ext cx="14935200" cy="828675"/>
-          </a:xfrm>
-        </p:spPr>
+        <p:spPr/>
         <p:txBody>
           <a:bodyPr/>
           <a:lstStyle/>
           <a:p>
             <a:r>
               <a:rPr lang="en-US" dirty="0" smtClean="0"/>
-              <a:t>GE: Exporting Reports</a:t>
+              <a:t>Review Questions</a:t>
             </a:r>
             <a:endParaRPr lang="en-US" dirty="0"/>
           </a:p>
@@ -13606,207 +14322,77 @@
             <p:ph type="body" sz="quarter" idx="12"/>
           </p:nvPr>
         </p:nvSpPr>
-        <p:spPr>
-          <a:xfrm>
-            <a:off x="590405" y="1856198"/>
-            <a:ext cx="15474348" cy="5345953"/>
-          </a:xfrm>
-        </p:spPr>
+        <p:spPr/>
         <p:txBody>
           <a:bodyPr/>
           <a:lstStyle/>
           <a:p>
-            <a:r>
-              <a:rPr lang="en-US" sz="2400" dirty="0" smtClean="0"/>
-              <a:t>TBD Add export API info</a:t>
-            </a:r>
-          </a:p>
-          <a:p>
-            <a:r>
-              <a:rPr lang="en-US" sz="2400" dirty="0"/>
-              <a:t>Are there plans to have the title of a scheduled job appear in the Reports page</a:t>
-            </a:r>
-            <a:r>
-              <a:rPr lang="en-US" sz="2400" dirty="0" smtClean="0"/>
-              <a:t>? yes.</a:t>
-            </a:r>
-          </a:p>
-          <a:p>
-            <a:endParaRPr lang="en-US" sz="2400" dirty="0"/>
-          </a:p>
-          <a:p>
-            <a:r>
-              <a:rPr lang="en-US" sz="2400" dirty="0"/>
-              <a:t>reports can also be fully consumed via API. Everything that is available in UI is available via API as well, since the UI only uses our official API</a:t>
-            </a:r>
-            <a:r>
-              <a:rPr lang="en-US" sz="2400" i="1" dirty="0"/>
-              <a:t/>
+            <a:pPr marL="514350" indent="-514350">
+              <a:buFont typeface="+mj-lt"/>
+              <a:buAutoNum type="arabicPeriod"/>
+            </a:pPr>
+            <a:r>
+              <a:rPr lang="en-US" dirty="0" smtClean="0"/>
+              <a:t>When scheduling one time scans, which time zone does the web UI use?</a:t>
             </a:r>
             <a:br>
-              <a:rPr lang="en-US" sz="2400" i="1" dirty="0"/>
+              <a:rPr lang="en-US" dirty="0" smtClean="0"/>
             </a:br>
-            <a:endParaRPr lang="en-US" sz="2400" dirty="0"/>
-          </a:p>
-          <a:p>
-            <a:r>
-              <a:rPr lang="en-US" sz="2400" b="1" dirty="0" err="1">
-                <a:hlinkClick r:id="rId2"/>
-              </a:rPr>
-              <a:t>steve_delfante</a:t>
-            </a:r>
-            <a:r>
-              <a:rPr lang="en-US" sz="2400" dirty="0"/>
-              <a:t> </a:t>
-            </a:r>
-            <a:r>
-              <a:rPr lang="en-US" sz="2400" i="1" dirty="0">
-                <a:hlinkClick r:id="rId3" tooltip="Feb 2nd at 1:26:10 PM&lt;br&gt;Click to open in archives"/>
-              </a:rPr>
-              <a:t>[</a:t>
-            </a:r>
-            <a:r>
-              <a:rPr lang="en-US" sz="2400" dirty="0">
-                <a:hlinkClick r:id="rId3" tooltip="Feb 2nd at 1:26:10 PM&lt;br&gt;Click to open in archives"/>
-              </a:rPr>
-              <a:t>1:26 PM</a:t>
-            </a:r>
-            <a:r>
-              <a:rPr lang="en-US" sz="2400" i="1" dirty="0">
-                <a:hlinkClick r:id="rId3" tooltip="Feb 2nd at 1:26:10 PM&lt;br&gt;Click to open in archives"/>
-              </a:rPr>
-              <a:t>]</a:t>
-            </a:r>
-            <a:r>
-              <a:rPr lang="en-US" sz="2400" dirty="0"/>
-              <a:t> </a:t>
-            </a:r>
-            <a:r>
-              <a:rPr lang="en-US" sz="2400" dirty="0">
-                <a:hlinkClick r:id="rId4"/>
-              </a:rPr>
-              <a:t>@</a:t>
-            </a:r>
-            <a:r>
-              <a:rPr lang="en-US" sz="2400" dirty="0" err="1">
-                <a:hlinkClick r:id="rId4"/>
-              </a:rPr>
-              <a:t>chris</a:t>
-            </a:r>
-            <a:r>
-              <a:rPr lang="en-US" sz="2400" dirty="0">
-                <a:hlinkClick r:id="rId4"/>
-              </a:rPr>
-              <a:t>-rock</a:t>
-            </a:r>
-            <a:r>
-              <a:rPr lang="en-US" sz="2400" dirty="0"/>
-              <a:t>: But we are still working toward exporting reports via the UI (Excel, email ??)</a:t>
-            </a:r>
-            <a:r>
-              <a:rPr lang="en-US" sz="2400" i="1" dirty="0"/>
-              <a:t/>
+            <a:endParaRPr lang="en-US" dirty="0"/>
+          </a:p>
+          <a:p>
+            <a:pPr marL="514350" indent="-514350">
+              <a:buFont typeface="+mj-lt"/>
+              <a:buAutoNum type="arabicPeriod"/>
+            </a:pPr>
+            <a:r>
+              <a:rPr lang="en-US" dirty="0" smtClean="0"/>
+              <a:t>When </a:t>
+            </a:r>
+            <a:r>
+              <a:rPr lang="en-US" dirty="0"/>
+              <a:t>scheduling </a:t>
+            </a:r>
+            <a:r>
+              <a:rPr lang="en-US" dirty="0" smtClean="0"/>
+              <a:t>recurring scans</a:t>
+            </a:r>
+            <a:r>
+              <a:rPr lang="en-US" dirty="0"/>
+              <a:t>, which time zone does the web UI use?</a:t>
             </a:r>
             <a:br>
-              <a:rPr lang="en-US" sz="2400" i="1" dirty="0"/>
+              <a:rPr lang="en-US" dirty="0"/>
             </a:br>
-            <a:endParaRPr lang="en-US" sz="2400" dirty="0"/>
-          </a:p>
-          <a:p>
-            <a:r>
-              <a:rPr lang="en-US" sz="2400" b="1" dirty="0" err="1">
-                <a:hlinkClick r:id="rId4"/>
-              </a:rPr>
-              <a:t>chris</a:t>
-            </a:r>
-            <a:r>
-              <a:rPr lang="en-US" sz="2400" b="1" dirty="0">
-                <a:hlinkClick r:id="rId4"/>
-              </a:rPr>
-              <a:t>-rock</a:t>
-            </a:r>
-            <a:r>
-              <a:rPr lang="en-US" sz="2400" dirty="0"/>
-              <a:t> </a:t>
-            </a:r>
-            <a:r>
-              <a:rPr lang="en-US" sz="2400" i="1" dirty="0">
-                <a:hlinkClick r:id="rId5"/>
-              </a:rPr>
-              <a:t>[</a:t>
-            </a:r>
-            <a:r>
-              <a:rPr lang="en-US" sz="2400" dirty="0">
-                <a:hlinkClick r:id="rId5"/>
-              </a:rPr>
-              <a:t>1:27 PM</a:t>
-            </a:r>
-            <a:r>
-              <a:rPr lang="en-US" sz="2400" i="1" dirty="0">
-                <a:hlinkClick r:id="rId5"/>
-              </a:rPr>
-              <a:t>]</a:t>
-            </a:r>
-            <a:r>
-              <a:rPr lang="en-US" sz="2400" dirty="0"/>
-              <a:t> yes</a:t>
-            </a:r>
-            <a:r>
-              <a:rPr lang="en-US" sz="2400" i="1" dirty="0"/>
-              <a:t/>
+            <a:r>
+              <a:rPr lang="en-US" dirty="0" smtClean="0"/>
+              <a:t>answer</a:t>
             </a:r>
             <a:br>
-              <a:rPr lang="en-US" sz="2400" i="1" dirty="0"/>
+              <a:rPr lang="en-US" dirty="0" smtClean="0"/>
             </a:br>
-            <a:endParaRPr lang="en-US" sz="2400" dirty="0"/>
-          </a:p>
-          <a:p>
-            <a:r>
-              <a:rPr lang="en-US" sz="2400" i="1" dirty="0">
-                <a:hlinkClick r:id="rId6" tooltip="Feb 2nd at 1:27:45 PM&lt;br&gt;Click to open in archives"/>
-              </a:rPr>
-              <a:t>[</a:t>
-            </a:r>
-            <a:r>
-              <a:rPr lang="en-US" sz="2400" dirty="0">
-                <a:hlinkClick r:id="rId6" tooltip="Feb 2nd at 1:27:45 PM&lt;br&gt;Click to open in archives"/>
-              </a:rPr>
-              <a:t>1:27</a:t>
-            </a:r>
-            <a:r>
-              <a:rPr lang="en-US" sz="2400" i="1" dirty="0">
-                <a:hlinkClick r:id="rId6" tooltip="Feb 2nd at 1:27:45 PM&lt;br&gt;Click to open in archives"/>
-              </a:rPr>
-              <a:t>]</a:t>
-            </a:r>
-            <a:r>
-              <a:rPr lang="en-US" sz="2400" dirty="0"/>
-              <a:t> </a:t>
-            </a:r>
-          </a:p>
-          <a:p>
-            <a:r>
-              <a:rPr lang="en-US" sz="2400" dirty="0"/>
-              <a:t>csv and pdf exports, but this will be earliest Q2, since Chef Server integration has higher </a:t>
-            </a:r>
-            <a:r>
-              <a:rPr lang="en-US" sz="2400" dirty="0" err="1"/>
-              <a:t>prio</a:t>
-            </a:r>
-            <a:endParaRPr lang="en-US" sz="2400" dirty="0"/>
-          </a:p>
-          <a:p>
-            <a:endParaRPr lang="en-US" sz="2400" dirty="0" smtClean="0"/>
-          </a:p>
-          <a:p>
-            <a:endParaRPr lang="en-US" sz="2400" dirty="0"/>
+            <a:endParaRPr lang="en-US" dirty="0" smtClean="0"/>
+          </a:p>
+          <a:p>
+            <a:pPr marL="514350" indent="-514350">
+              <a:buFont typeface="+mj-lt"/>
+              <a:buAutoNum type="arabicPeriod"/>
+            </a:pPr>
+            <a:r>
+              <a:rPr lang="en-US" dirty="0" smtClean="0"/>
+              <a:t>In Chef Compliance, what are "Jobs"?</a:t>
+            </a:r>
+            <a:br>
+              <a:rPr lang="en-US" dirty="0" smtClean="0"/>
+            </a:br>
+            <a:endParaRPr lang="en-US" dirty="0" smtClean="0"/>
           </a:p>
         </p:txBody>
       </p:sp>
     </p:spTree>
     <p:extLst>
       <p:ext uri="{BB962C8B-B14F-4D97-AF65-F5344CB8AC3E}">
-        <p14:creationId xmlns:p14="http://schemas.microsoft.com/office/powerpoint/2010/main" val="1901656965"/>
+        <p14:creationId xmlns:p14="http://schemas.microsoft.com/office/powerpoint/2010/main" val="2975229223"/>
       </p:ext>
     </p:extLst>
   </p:cSld>
@@ -13899,28 +14485,11 @@
           <a:p>
             <a:pPr marL="514350" indent="-514350">
               <a:buFont typeface="+mj-lt"/>
-              <a:buAutoNum type="arabicPeriod"/>
+              <a:buAutoNum type="arabicPeriod" startAt="4"/>
             </a:pPr>
             <a:r>
               <a:rPr lang="en-US" dirty="0" smtClean="0"/>
-              <a:t>What is ...?</a:t>
-            </a:r>
-            <a:br>
-              <a:rPr lang="en-US" dirty="0" smtClean="0"/>
-            </a:br>
-            <a:r>
-              <a:rPr lang="en-US" dirty="0" smtClean="0"/>
-              <a:t>______________________________</a:t>
-            </a:r>
-          </a:p>
-          <a:p>
-            <a:pPr marL="514350" indent="-514350">
-              <a:buFont typeface="+mj-lt"/>
-              <a:buAutoNum type="arabicPeriod"/>
-            </a:pPr>
-            <a:r>
-              <a:rPr lang="en-US" dirty="0" smtClean="0"/>
-              <a:t>Which is the correct answer?  </a:t>
+              <a:t>Where can you view the results of a scheduled scan?</a:t>
             </a:r>
           </a:p>
           <a:p>
@@ -13930,7 +14499,7 @@
             </a:pPr>
             <a:r>
               <a:rPr lang="en-US" dirty="0" smtClean="0"/>
-              <a:t>answer</a:t>
+              <a:t>On the Jobs page.</a:t>
             </a:r>
           </a:p>
           <a:p>
@@ -13940,7 +14509,7 @@
             </a:pPr>
             <a:r>
               <a:rPr lang="en-US" dirty="0" smtClean="0"/>
-              <a:t>answer</a:t>
+              <a:t>On the Reports page.</a:t>
             </a:r>
           </a:p>
           <a:p>
@@ -13950,7 +14519,7 @@
             </a:pPr>
             <a:r>
               <a:rPr lang="en-US" dirty="0" smtClean="0"/>
-              <a:t>answer</a:t>
+              <a:t>On the Dashboard.</a:t>
             </a:r>
           </a:p>
           <a:p>
@@ -13960,31 +14529,28 @@
             </a:pPr>
             <a:r>
               <a:rPr lang="en-US" dirty="0" smtClean="0"/>
-              <a:t>answer</a:t>
-            </a:r>
-            <a:br>
-              <a:rPr lang="en-US" dirty="0" smtClean="0"/>
-            </a:br>
-            <a:endParaRPr lang="en-US" dirty="0" smtClean="0"/>
+              <a:t>On the Compliance page.</a:t>
+            </a:r>
+          </a:p>
+          <a:p>
+            <a:pPr marL="822325" lvl="1" indent="-514350">
+              <a:buFont typeface="+mj-lt"/>
+              <a:buAutoNum type="alphaLcPeriod"/>
+            </a:pPr>
+            <a:endParaRPr lang="en-US" dirty="0"/>
           </a:p>
           <a:p>
             <a:pPr marL="514350" indent="-514350">
               <a:buFont typeface="+mj-lt"/>
-              <a:buAutoNum type="arabicPeriod"/>
+              <a:buAutoNum type="arabicPeriod" startAt="4"/>
             </a:pPr>
             <a:r>
               <a:rPr lang="en-US" dirty="0" smtClean="0"/>
-              <a:t>Capable of carrying on a conversation</a:t>
-            </a:r>
-          </a:p>
-          <a:p>
-            <a:pPr marL="514350" indent="-514350">
-              <a:buFont typeface="+mj-lt"/>
-              <a:buAutoNum type="arabicPeriod"/>
-            </a:pPr>
-            <a:r>
-              <a:rPr lang="en-US" dirty="0" smtClean="0"/>
-              <a:t>Explain</a:t>
+              <a:t>What </a:t>
+            </a:r>
+            <a:r>
+              <a:rPr lang="en-US" dirty="0" smtClean="0"/>
+              <a:t>methods are available for exporting reports?</a:t>
             </a:r>
             <a:endParaRPr lang="en-US" dirty="0"/>
           </a:p>

</xml_diff>